<commit_message>
Changes from last exersise
</commit_message>
<xml_diff>
--- a/ML_Ass_1_Python27/Präsentation.pptx
+++ b/ML_Ass_1_Python27/Präsentation.pptx
@@ -5,16 +5,20 @@
     <p:sldMasterId id="2147483648" r:id="rId1"/>
   </p:sldMasterIdLst>
   <p:notesMasterIdLst>
-    <p:notesMasterId r:id="rId6"/>
+    <p:notesMasterId r:id="rId10"/>
   </p:notesMasterIdLst>
   <p:handoutMasterIdLst>
-    <p:handoutMasterId r:id="rId7"/>
+    <p:handoutMasterId r:id="rId11"/>
   </p:handoutMasterIdLst>
   <p:sldIdLst>
     <p:sldId id="256" r:id="rId2"/>
     <p:sldId id="257" r:id="rId3"/>
-    <p:sldId id="259" r:id="rId4"/>
-    <p:sldId id="260" r:id="rId5"/>
+    <p:sldId id="264" r:id="rId4"/>
+    <p:sldId id="259" r:id="rId5"/>
+    <p:sldId id="265" r:id="rId6"/>
+    <p:sldId id="261" r:id="rId7"/>
+    <p:sldId id="263" r:id="rId8"/>
+    <p:sldId id="260" r:id="rId9"/>
   </p:sldIdLst>
   <p:sldSz cx="9217025" cy="5184775"/>
   <p:notesSz cx="6858000" cy="9144000"/>
@@ -291,7 +295,7 @@
           <a:p>
             <a:fld id="{9726303E-CDC6-4E11-A9F4-E5CE5F23E089}" type="datetimeFigureOut">
               <a:rPr lang="de-DE" smtClean="0"/>
-              <a:t>09.11.2017</a:t>
+              <a:t>10.11.2017</a:t>
             </a:fld>
             <a:endParaRPr lang="de-DE"/>
           </a:p>
@@ -665,7 +669,7 @@
           <a:p>
             <a:fld id="{9726303E-CDC6-4E11-A9F4-E5CE5F23E089}" type="datetimeFigureOut">
               <a:rPr lang="de-DE" smtClean="0"/>
-              <a:t>09.11.2017</a:t>
+              <a:t>10.11.2017</a:t>
             </a:fld>
             <a:endParaRPr lang="de-DE"/>
           </a:p>
@@ -924,6 +928,159 @@
             <p:ph type="sldImg"/>
           </p:nvPr>
         </p:nvSpPr>
+        <p:spPr/>
+      </p:sp>
+      <p:sp>
+        <p:nvSpPr>
+          <p:cNvPr id="3" name="Notizenplatzhalter 2"/>
+          <p:cNvSpPr>
+            <a:spLocks noGrp="1"/>
+          </p:cNvSpPr>
+          <p:nvPr>
+            <p:ph type="body" idx="1"/>
+          </p:nvPr>
+        </p:nvSpPr>
+        <p:spPr/>
+        <p:txBody>
+          <a:bodyPr/>
+          <a:lstStyle/>
+          <a:p>
+            <a:endParaRPr lang="de-DE" dirty="0"/>
+          </a:p>
+        </p:txBody>
+      </p:sp>
+      <p:sp>
+        <p:nvSpPr>
+          <p:cNvPr id="4" name="Kopfzeilenplatzhalter 3"/>
+          <p:cNvSpPr>
+            <a:spLocks noGrp="1"/>
+          </p:cNvSpPr>
+          <p:nvPr>
+            <p:ph type="hdr" sz="quarter" idx="10"/>
+          </p:nvPr>
+        </p:nvSpPr>
+        <p:spPr/>
+        <p:txBody>
+          <a:bodyPr/>
+          <a:lstStyle/>
+          <a:p>
+            <a:r>
+              <a:rPr lang="de-DE"/>
+              <a:t>Präsentationstitel</a:t>
+            </a:r>
+            <a:endParaRPr lang="de-DE" dirty="0"/>
+          </a:p>
+        </p:txBody>
+      </p:sp>
+      <p:sp>
+        <p:nvSpPr>
+          <p:cNvPr id="5" name="Datumsplatzhalter 4"/>
+          <p:cNvSpPr>
+            <a:spLocks noGrp="1"/>
+          </p:cNvSpPr>
+          <p:nvPr>
+            <p:ph type="dt" sz="quarter" idx="11"/>
+          </p:nvPr>
+        </p:nvSpPr>
+        <p:spPr/>
+        <p:txBody>
+          <a:bodyPr/>
+          <a:lstStyle/>
+          <a:p>
+            <a:fld id="{EA01E532-3BA7-4831-8011-F32CAED0250C}" type="datetime1">
+              <a:rPr lang="de-DE" smtClean="0"/>
+              <a:t>10.11.2017</a:t>
+            </a:fld>
+            <a:endParaRPr lang="de-DE"/>
+          </a:p>
+        </p:txBody>
+      </p:sp>
+      <p:sp>
+        <p:nvSpPr>
+          <p:cNvPr id="6" name="Fußzeilenplatzhalter 5"/>
+          <p:cNvSpPr>
+            <a:spLocks noGrp="1"/>
+          </p:cNvSpPr>
+          <p:nvPr>
+            <p:ph type="ftr" sz="quarter" idx="12"/>
+          </p:nvPr>
+        </p:nvSpPr>
+        <p:spPr/>
+        <p:txBody>
+          <a:bodyPr/>
+          <a:lstStyle/>
+          <a:p>
+            <a:r>
+              <a:rPr lang="de-DE"/>
+              <a:t>Autor/Veranstaltung</a:t>
+            </a:r>
+            <a:endParaRPr lang="de-DE" dirty="0"/>
+          </a:p>
+        </p:txBody>
+      </p:sp>
+      <p:sp>
+        <p:nvSpPr>
+          <p:cNvPr id="7" name="Foliennummernplatzhalter 6"/>
+          <p:cNvSpPr>
+            <a:spLocks noGrp="1"/>
+          </p:cNvSpPr>
+          <p:nvPr>
+            <p:ph type="sldNum" sz="quarter" idx="13"/>
+          </p:nvPr>
+        </p:nvSpPr>
+        <p:spPr/>
+        <p:txBody>
+          <a:bodyPr/>
+          <a:lstStyle/>
+          <a:p>
+            <a:fld id="{B40210A4-2901-42F9-8CA9-E251F67383C7}" type="slidenum">
+              <a:rPr lang="de-DE" smtClean="0"/>
+              <a:t>2</a:t>
+            </a:fld>
+            <a:endParaRPr lang="de-DE"/>
+          </a:p>
+        </p:txBody>
+      </p:sp>
+    </p:spTree>
+    <p:extLst>
+      <p:ext uri="{BB962C8B-B14F-4D97-AF65-F5344CB8AC3E}">
+        <p14:creationId xmlns:p14="http://schemas.microsoft.com/office/powerpoint/2010/main" val="1564783093"/>
+      </p:ext>
+    </p:extLst>
+  </p:cSld>
+  <p:clrMapOvr>
+    <a:masterClrMapping/>
+  </p:clrMapOvr>
+</p:notes>
+</file>
+
+<file path=ppt/notesSlides/notesSlide2.xml><?xml version="1.0" encoding="utf-8"?>
+<p:notes xmlns:a="http://schemas.openxmlformats.org/drawingml/2006/main" xmlns:r="http://schemas.openxmlformats.org/officeDocument/2006/relationships" xmlns:p="http://schemas.openxmlformats.org/presentationml/2006/main">
+  <p:cSld>
+    <p:spTree>
+      <p:nvGrpSpPr>
+        <p:cNvPr id="1" name=""/>
+        <p:cNvGrpSpPr/>
+        <p:nvPr/>
+      </p:nvGrpSpPr>
+      <p:grpSpPr>
+        <a:xfrm>
+          <a:off x="0" y="0"/>
+          <a:ext cx="0" cy="0"/>
+          <a:chOff x="0" y="0"/>
+          <a:chExt cx="0" cy="0"/>
+        </a:xfrm>
+      </p:grpSpPr>
+      <p:sp>
+        <p:nvSpPr>
+          <p:cNvPr id="2" name="Folienbildplatzhalter 1"/>
+          <p:cNvSpPr>
+            <a:spLocks noGrp="1" noRot="1" noChangeAspect="1"/>
+          </p:cNvSpPr>
+          <p:nvPr>
+            <p:ph type="sldImg"/>
+          </p:nvPr>
+        </p:nvSpPr>
         <p:spPr>
           <a:xfrm>
             <a:off x="382588" y="1116013"/>
@@ -946,19 +1103,7 @@
           <a:bodyPr/>
           <a:lstStyle/>
           <a:p>
-            <a:r>
-              <a:rPr lang="en-US" sz="4000" dirty="0"/>
-              <a:t>(With “flipping”, we mean that the label indicating trisomy, is replaced by the label indicating a healthy mouse, and </a:t>
-            </a:r>
-            <a:r>
-              <a:rPr lang="en-US" sz="4000" dirty="0" err="1"/>
-              <a:t>vica</a:t>
-            </a:r>
-            <a:r>
-              <a:rPr lang="en-US" sz="4000" dirty="0"/>
-              <a:t> versa.) This way, you generate a “noisy” version of the labels of the training data. </a:t>
-            </a:r>
-            <a:endParaRPr lang="de-DE" sz="4000" dirty="0"/>
+            <a:endParaRPr lang="de-DE" dirty="0"/>
           </a:p>
         </p:txBody>
       </p:sp>
@@ -1000,9 +1145,9 @@
           <a:bodyPr/>
           <a:lstStyle/>
           <a:p>
-            <a:fld id="{57D0303F-3DAF-4A6B-82D1-800CC55ACE37}" type="datetime1">
+            <a:fld id="{B604FC25-97C2-4A57-85E7-B300A73F5385}" type="datetime1">
               <a:rPr lang="de-DE" smtClean="0"/>
-              <a:t>09.11.2017</a:t>
+              <a:t>10.11.2017</a:t>
             </a:fld>
             <a:endParaRPr lang="de-DE"/>
           </a:p>
@@ -1057,7 +1202,651 @@
     </p:spTree>
     <p:extLst>
       <p:ext uri="{BB962C8B-B14F-4D97-AF65-F5344CB8AC3E}">
+        <p14:creationId xmlns:p14="http://schemas.microsoft.com/office/powerpoint/2010/main" val="2662567342"/>
+      </p:ext>
+    </p:extLst>
+  </p:cSld>
+  <p:clrMapOvr>
+    <a:masterClrMapping/>
+  </p:clrMapOvr>
+</p:notes>
+</file>
+
+<file path=ppt/notesSlides/notesSlide3.xml><?xml version="1.0" encoding="utf-8"?>
+<p:notes xmlns:a="http://schemas.openxmlformats.org/drawingml/2006/main" xmlns:r="http://schemas.openxmlformats.org/officeDocument/2006/relationships" xmlns:p="http://schemas.openxmlformats.org/presentationml/2006/main">
+  <p:cSld>
+    <p:spTree>
+      <p:nvGrpSpPr>
+        <p:cNvPr id="1" name=""/>
+        <p:cNvGrpSpPr/>
+        <p:nvPr/>
+      </p:nvGrpSpPr>
+      <p:grpSpPr>
+        <a:xfrm>
+          <a:off x="0" y="0"/>
+          <a:ext cx="0" cy="0"/>
+          <a:chOff x="0" y="0"/>
+          <a:chExt cx="0" cy="0"/>
+        </a:xfrm>
+      </p:grpSpPr>
+      <p:sp>
+        <p:nvSpPr>
+          <p:cNvPr id="2" name="Folienbildplatzhalter 1"/>
+          <p:cNvSpPr>
+            <a:spLocks noGrp="1" noRot="1" noChangeAspect="1"/>
+          </p:cNvSpPr>
+          <p:nvPr>
+            <p:ph type="sldImg"/>
+          </p:nvPr>
+        </p:nvSpPr>
+        <p:spPr>
+          <a:xfrm>
+            <a:off x="382588" y="1116013"/>
+            <a:ext cx="6092825" cy="3429000"/>
+          </a:xfrm>
+        </p:spPr>
+      </p:sp>
+      <p:sp>
+        <p:nvSpPr>
+          <p:cNvPr id="3" name="Notizenplatzhalter 2"/>
+          <p:cNvSpPr>
+            <a:spLocks noGrp="1"/>
+          </p:cNvSpPr>
+          <p:nvPr>
+            <p:ph type="body" idx="1"/>
+          </p:nvPr>
+        </p:nvSpPr>
+        <p:spPr/>
+        <p:txBody>
+          <a:bodyPr/>
+          <a:lstStyle/>
+          <a:p>
+            <a:endParaRPr lang="de-DE" sz="4000" dirty="0"/>
+          </a:p>
+        </p:txBody>
+      </p:sp>
+      <p:sp>
+        <p:nvSpPr>
+          <p:cNvPr id="4" name="Kopfzeilenplatzhalter 3"/>
+          <p:cNvSpPr>
+            <a:spLocks noGrp="1"/>
+          </p:cNvSpPr>
+          <p:nvPr>
+            <p:ph type="hdr" sz="quarter" idx="10"/>
+          </p:nvPr>
+        </p:nvSpPr>
+        <p:spPr/>
+        <p:txBody>
+          <a:bodyPr/>
+          <a:lstStyle/>
+          <a:p>
+            <a:r>
+              <a:rPr lang="de-DE"/>
+              <a:t>Präsentationstitel</a:t>
+            </a:r>
+            <a:endParaRPr lang="de-DE" dirty="0"/>
+          </a:p>
+        </p:txBody>
+      </p:sp>
+      <p:sp>
+        <p:nvSpPr>
+          <p:cNvPr id="5" name="Datumsplatzhalter 4"/>
+          <p:cNvSpPr>
+            <a:spLocks noGrp="1"/>
+          </p:cNvSpPr>
+          <p:nvPr>
+            <p:ph type="dt" sz="quarter" idx="11"/>
+          </p:nvPr>
+        </p:nvSpPr>
+        <p:spPr/>
+        <p:txBody>
+          <a:bodyPr/>
+          <a:lstStyle/>
+          <a:p>
+            <a:fld id="{57D0303F-3DAF-4A6B-82D1-800CC55ACE37}" type="datetime1">
+              <a:rPr lang="de-DE" smtClean="0"/>
+              <a:t>10.11.2017</a:t>
+            </a:fld>
+            <a:endParaRPr lang="de-DE"/>
+          </a:p>
+        </p:txBody>
+      </p:sp>
+      <p:sp>
+        <p:nvSpPr>
+          <p:cNvPr id="6" name="Fußzeilenplatzhalter 5"/>
+          <p:cNvSpPr>
+            <a:spLocks noGrp="1"/>
+          </p:cNvSpPr>
+          <p:nvPr>
+            <p:ph type="ftr" sz="quarter" idx="12"/>
+          </p:nvPr>
+        </p:nvSpPr>
+        <p:spPr/>
+        <p:txBody>
+          <a:bodyPr/>
+          <a:lstStyle/>
+          <a:p>
+            <a:r>
+              <a:rPr lang="de-DE"/>
+              <a:t>Autor/Veranstaltung</a:t>
+            </a:r>
+            <a:endParaRPr lang="de-DE" dirty="0"/>
+          </a:p>
+        </p:txBody>
+      </p:sp>
+      <p:sp>
+        <p:nvSpPr>
+          <p:cNvPr id="7" name="Foliennummernplatzhalter 6"/>
+          <p:cNvSpPr>
+            <a:spLocks noGrp="1"/>
+          </p:cNvSpPr>
+          <p:nvPr>
+            <p:ph type="sldNum" sz="quarter" idx="13"/>
+          </p:nvPr>
+        </p:nvSpPr>
+        <p:spPr/>
+        <p:txBody>
+          <a:bodyPr/>
+          <a:lstStyle/>
+          <a:p>
+            <a:fld id="{B40210A4-2901-42F9-8CA9-E251F67383C7}" type="slidenum">
+              <a:rPr lang="de-DE" smtClean="0"/>
+              <a:t>4</a:t>
+            </a:fld>
+            <a:endParaRPr lang="de-DE"/>
+          </a:p>
+        </p:txBody>
+      </p:sp>
+    </p:spTree>
+    <p:extLst>
+      <p:ext uri="{BB962C8B-B14F-4D97-AF65-F5344CB8AC3E}">
         <p14:creationId xmlns:p14="http://schemas.microsoft.com/office/powerpoint/2010/main" val="1465385159"/>
+      </p:ext>
+    </p:extLst>
+  </p:cSld>
+  <p:clrMapOvr>
+    <a:masterClrMapping/>
+  </p:clrMapOvr>
+</p:notes>
+</file>
+
+<file path=ppt/notesSlides/notesSlide4.xml><?xml version="1.0" encoding="utf-8"?>
+<p:notes xmlns:a="http://schemas.openxmlformats.org/drawingml/2006/main" xmlns:r="http://schemas.openxmlformats.org/officeDocument/2006/relationships" xmlns:p="http://schemas.openxmlformats.org/presentationml/2006/main">
+  <p:cSld>
+    <p:spTree>
+      <p:nvGrpSpPr>
+        <p:cNvPr id="1" name=""/>
+        <p:cNvGrpSpPr/>
+        <p:nvPr/>
+      </p:nvGrpSpPr>
+      <p:grpSpPr>
+        <a:xfrm>
+          <a:off x="0" y="0"/>
+          <a:ext cx="0" cy="0"/>
+          <a:chOff x="0" y="0"/>
+          <a:chExt cx="0" cy="0"/>
+        </a:xfrm>
+      </p:grpSpPr>
+      <p:sp>
+        <p:nvSpPr>
+          <p:cNvPr id="2" name="Folienbildplatzhalter 1"/>
+          <p:cNvSpPr>
+            <a:spLocks noGrp="1" noRot="1" noChangeAspect="1"/>
+          </p:cNvSpPr>
+          <p:nvPr>
+            <p:ph type="sldImg"/>
+          </p:nvPr>
+        </p:nvSpPr>
+        <p:spPr>
+          <a:xfrm>
+            <a:off x="382588" y="1116013"/>
+            <a:ext cx="6092825" cy="3429000"/>
+          </a:xfrm>
+        </p:spPr>
+      </p:sp>
+      <p:sp>
+        <p:nvSpPr>
+          <p:cNvPr id="3" name="Notizenplatzhalter 2"/>
+          <p:cNvSpPr>
+            <a:spLocks noGrp="1"/>
+          </p:cNvSpPr>
+          <p:nvPr>
+            <p:ph type="body" idx="1"/>
+          </p:nvPr>
+        </p:nvSpPr>
+        <p:spPr/>
+        <p:txBody>
+          <a:bodyPr/>
+          <a:lstStyle/>
+          <a:p>
+            <a:r>
+              <a:rPr lang="en-US" sz="4000" dirty="0"/>
+              <a:t>(With “flipping”, we mean that the label indicating trisomy, is replaced by the label indicating a healthy mouse, and </a:t>
+            </a:r>
+            <a:r>
+              <a:rPr lang="en-US" sz="4000" dirty="0" err="1"/>
+              <a:t>vica</a:t>
+            </a:r>
+            <a:r>
+              <a:rPr lang="en-US" sz="4000" dirty="0"/>
+              <a:t> versa.) This way, you generate a “noisy” version of the labels of the training data. </a:t>
+            </a:r>
+            <a:endParaRPr lang="de-DE" sz="4000" dirty="0"/>
+          </a:p>
+        </p:txBody>
+      </p:sp>
+      <p:sp>
+        <p:nvSpPr>
+          <p:cNvPr id="4" name="Kopfzeilenplatzhalter 3"/>
+          <p:cNvSpPr>
+            <a:spLocks noGrp="1"/>
+          </p:cNvSpPr>
+          <p:nvPr>
+            <p:ph type="hdr" sz="quarter" idx="10"/>
+          </p:nvPr>
+        </p:nvSpPr>
+        <p:spPr/>
+        <p:txBody>
+          <a:bodyPr/>
+          <a:lstStyle/>
+          <a:p>
+            <a:r>
+              <a:rPr lang="de-DE"/>
+              <a:t>Präsentationstitel</a:t>
+            </a:r>
+            <a:endParaRPr lang="de-DE" dirty="0"/>
+          </a:p>
+        </p:txBody>
+      </p:sp>
+      <p:sp>
+        <p:nvSpPr>
+          <p:cNvPr id="5" name="Datumsplatzhalter 4"/>
+          <p:cNvSpPr>
+            <a:spLocks noGrp="1"/>
+          </p:cNvSpPr>
+          <p:nvPr>
+            <p:ph type="dt" sz="quarter" idx="11"/>
+          </p:nvPr>
+        </p:nvSpPr>
+        <p:spPr/>
+        <p:txBody>
+          <a:bodyPr/>
+          <a:lstStyle/>
+          <a:p>
+            <a:fld id="{57D0303F-3DAF-4A6B-82D1-800CC55ACE37}" type="datetime1">
+              <a:rPr lang="de-DE" smtClean="0"/>
+              <a:t>10.11.2017</a:t>
+            </a:fld>
+            <a:endParaRPr lang="de-DE"/>
+          </a:p>
+        </p:txBody>
+      </p:sp>
+      <p:sp>
+        <p:nvSpPr>
+          <p:cNvPr id="6" name="Fußzeilenplatzhalter 5"/>
+          <p:cNvSpPr>
+            <a:spLocks noGrp="1"/>
+          </p:cNvSpPr>
+          <p:nvPr>
+            <p:ph type="ftr" sz="quarter" idx="12"/>
+          </p:nvPr>
+        </p:nvSpPr>
+        <p:spPr/>
+        <p:txBody>
+          <a:bodyPr/>
+          <a:lstStyle/>
+          <a:p>
+            <a:r>
+              <a:rPr lang="de-DE"/>
+              <a:t>Autor/Veranstaltung</a:t>
+            </a:r>
+            <a:endParaRPr lang="de-DE" dirty="0"/>
+          </a:p>
+        </p:txBody>
+      </p:sp>
+      <p:sp>
+        <p:nvSpPr>
+          <p:cNvPr id="7" name="Foliennummernplatzhalter 6"/>
+          <p:cNvSpPr>
+            <a:spLocks noGrp="1"/>
+          </p:cNvSpPr>
+          <p:nvPr>
+            <p:ph type="sldNum" sz="quarter" idx="13"/>
+          </p:nvPr>
+        </p:nvSpPr>
+        <p:spPr/>
+        <p:txBody>
+          <a:bodyPr/>
+          <a:lstStyle/>
+          <a:p>
+            <a:fld id="{B40210A4-2901-42F9-8CA9-E251F67383C7}" type="slidenum">
+              <a:rPr lang="de-DE" smtClean="0"/>
+              <a:t>5</a:t>
+            </a:fld>
+            <a:endParaRPr lang="de-DE"/>
+          </a:p>
+        </p:txBody>
+      </p:sp>
+    </p:spTree>
+    <p:extLst>
+      <p:ext uri="{BB962C8B-B14F-4D97-AF65-F5344CB8AC3E}">
+        <p14:creationId xmlns:p14="http://schemas.microsoft.com/office/powerpoint/2010/main" val="2852213382"/>
+      </p:ext>
+    </p:extLst>
+  </p:cSld>
+  <p:clrMapOvr>
+    <a:masterClrMapping/>
+  </p:clrMapOvr>
+</p:notes>
+</file>
+
+<file path=ppt/notesSlides/notesSlide5.xml><?xml version="1.0" encoding="utf-8"?>
+<p:notes xmlns:a="http://schemas.openxmlformats.org/drawingml/2006/main" xmlns:r="http://schemas.openxmlformats.org/officeDocument/2006/relationships" xmlns:p="http://schemas.openxmlformats.org/presentationml/2006/main">
+  <p:cSld>
+    <p:spTree>
+      <p:nvGrpSpPr>
+        <p:cNvPr id="1" name=""/>
+        <p:cNvGrpSpPr/>
+        <p:nvPr/>
+      </p:nvGrpSpPr>
+      <p:grpSpPr>
+        <a:xfrm>
+          <a:off x="0" y="0"/>
+          <a:ext cx="0" cy="0"/>
+          <a:chOff x="0" y="0"/>
+          <a:chExt cx="0" cy="0"/>
+        </a:xfrm>
+      </p:grpSpPr>
+      <p:sp>
+        <p:nvSpPr>
+          <p:cNvPr id="2" name="Folienbildplatzhalter 1"/>
+          <p:cNvSpPr>
+            <a:spLocks noGrp="1" noRot="1" noChangeAspect="1"/>
+          </p:cNvSpPr>
+          <p:nvPr>
+            <p:ph type="sldImg"/>
+          </p:nvPr>
+        </p:nvSpPr>
+        <p:spPr>
+          <a:xfrm>
+            <a:off x="382588" y="1116013"/>
+            <a:ext cx="6092825" cy="3429000"/>
+          </a:xfrm>
+        </p:spPr>
+      </p:sp>
+      <p:sp>
+        <p:nvSpPr>
+          <p:cNvPr id="3" name="Notizenplatzhalter 2"/>
+          <p:cNvSpPr>
+            <a:spLocks noGrp="1"/>
+          </p:cNvSpPr>
+          <p:nvPr>
+            <p:ph type="body" idx="1"/>
+          </p:nvPr>
+        </p:nvSpPr>
+        <p:spPr/>
+        <p:txBody>
+          <a:bodyPr/>
+          <a:lstStyle/>
+          <a:p>
+            <a:endParaRPr lang="de-DE" sz="4000" dirty="0"/>
+          </a:p>
+        </p:txBody>
+      </p:sp>
+      <p:sp>
+        <p:nvSpPr>
+          <p:cNvPr id="4" name="Kopfzeilenplatzhalter 3"/>
+          <p:cNvSpPr>
+            <a:spLocks noGrp="1"/>
+          </p:cNvSpPr>
+          <p:nvPr>
+            <p:ph type="hdr" sz="quarter" idx="10"/>
+          </p:nvPr>
+        </p:nvSpPr>
+        <p:spPr/>
+        <p:txBody>
+          <a:bodyPr/>
+          <a:lstStyle/>
+          <a:p>
+            <a:r>
+              <a:rPr lang="de-DE"/>
+              <a:t>Präsentationstitel</a:t>
+            </a:r>
+            <a:endParaRPr lang="de-DE" dirty="0"/>
+          </a:p>
+        </p:txBody>
+      </p:sp>
+      <p:sp>
+        <p:nvSpPr>
+          <p:cNvPr id="5" name="Datumsplatzhalter 4"/>
+          <p:cNvSpPr>
+            <a:spLocks noGrp="1"/>
+          </p:cNvSpPr>
+          <p:nvPr>
+            <p:ph type="dt" sz="quarter" idx="11"/>
+          </p:nvPr>
+        </p:nvSpPr>
+        <p:spPr/>
+        <p:txBody>
+          <a:bodyPr/>
+          <a:lstStyle/>
+          <a:p>
+            <a:fld id="{57D0303F-3DAF-4A6B-82D1-800CC55ACE37}" type="datetime1">
+              <a:rPr lang="de-DE" smtClean="0"/>
+              <a:t>10.11.2017</a:t>
+            </a:fld>
+            <a:endParaRPr lang="de-DE"/>
+          </a:p>
+        </p:txBody>
+      </p:sp>
+      <p:sp>
+        <p:nvSpPr>
+          <p:cNvPr id="6" name="Fußzeilenplatzhalter 5"/>
+          <p:cNvSpPr>
+            <a:spLocks noGrp="1"/>
+          </p:cNvSpPr>
+          <p:nvPr>
+            <p:ph type="ftr" sz="quarter" idx="12"/>
+          </p:nvPr>
+        </p:nvSpPr>
+        <p:spPr/>
+        <p:txBody>
+          <a:bodyPr/>
+          <a:lstStyle/>
+          <a:p>
+            <a:r>
+              <a:rPr lang="de-DE"/>
+              <a:t>Autor/Veranstaltung</a:t>
+            </a:r>
+            <a:endParaRPr lang="de-DE" dirty="0"/>
+          </a:p>
+        </p:txBody>
+      </p:sp>
+      <p:sp>
+        <p:nvSpPr>
+          <p:cNvPr id="7" name="Foliennummernplatzhalter 6"/>
+          <p:cNvSpPr>
+            <a:spLocks noGrp="1"/>
+          </p:cNvSpPr>
+          <p:nvPr>
+            <p:ph type="sldNum" sz="quarter" idx="13"/>
+          </p:nvPr>
+        </p:nvSpPr>
+        <p:spPr/>
+        <p:txBody>
+          <a:bodyPr/>
+          <a:lstStyle/>
+          <a:p>
+            <a:fld id="{B40210A4-2901-42F9-8CA9-E251F67383C7}" type="slidenum">
+              <a:rPr lang="de-DE" smtClean="0"/>
+              <a:t>6</a:t>
+            </a:fld>
+            <a:endParaRPr lang="de-DE"/>
+          </a:p>
+        </p:txBody>
+      </p:sp>
+    </p:spTree>
+    <p:extLst>
+      <p:ext uri="{BB962C8B-B14F-4D97-AF65-F5344CB8AC3E}">
+        <p14:creationId xmlns:p14="http://schemas.microsoft.com/office/powerpoint/2010/main" val="2826011721"/>
+      </p:ext>
+    </p:extLst>
+  </p:cSld>
+  <p:clrMapOvr>
+    <a:masterClrMapping/>
+  </p:clrMapOvr>
+</p:notes>
+</file>
+
+<file path=ppt/notesSlides/notesSlide6.xml><?xml version="1.0" encoding="utf-8"?>
+<p:notes xmlns:a="http://schemas.openxmlformats.org/drawingml/2006/main" xmlns:r="http://schemas.openxmlformats.org/officeDocument/2006/relationships" xmlns:p="http://schemas.openxmlformats.org/presentationml/2006/main">
+  <p:cSld>
+    <p:spTree>
+      <p:nvGrpSpPr>
+        <p:cNvPr id="1" name=""/>
+        <p:cNvGrpSpPr/>
+        <p:nvPr/>
+      </p:nvGrpSpPr>
+      <p:grpSpPr>
+        <a:xfrm>
+          <a:off x="0" y="0"/>
+          <a:ext cx="0" cy="0"/>
+          <a:chOff x="0" y="0"/>
+          <a:chExt cx="0" cy="0"/>
+        </a:xfrm>
+      </p:grpSpPr>
+      <p:sp>
+        <p:nvSpPr>
+          <p:cNvPr id="2" name="Folienbildplatzhalter 1"/>
+          <p:cNvSpPr>
+            <a:spLocks noGrp="1" noRot="1" noChangeAspect="1"/>
+          </p:cNvSpPr>
+          <p:nvPr>
+            <p:ph type="sldImg"/>
+          </p:nvPr>
+        </p:nvSpPr>
+        <p:spPr>
+          <a:xfrm>
+            <a:off x="382588" y="1116013"/>
+            <a:ext cx="6092825" cy="3429000"/>
+          </a:xfrm>
+        </p:spPr>
+      </p:sp>
+      <p:sp>
+        <p:nvSpPr>
+          <p:cNvPr id="3" name="Notizenplatzhalter 2"/>
+          <p:cNvSpPr>
+            <a:spLocks noGrp="1"/>
+          </p:cNvSpPr>
+          <p:nvPr>
+            <p:ph type="body" idx="1"/>
+          </p:nvPr>
+        </p:nvSpPr>
+        <p:spPr/>
+        <p:txBody>
+          <a:bodyPr/>
+          <a:lstStyle/>
+          <a:p>
+            <a:endParaRPr lang="de-DE" sz="4000" dirty="0"/>
+          </a:p>
+        </p:txBody>
+      </p:sp>
+      <p:sp>
+        <p:nvSpPr>
+          <p:cNvPr id="4" name="Kopfzeilenplatzhalter 3"/>
+          <p:cNvSpPr>
+            <a:spLocks noGrp="1"/>
+          </p:cNvSpPr>
+          <p:nvPr>
+            <p:ph type="hdr" sz="quarter" idx="10"/>
+          </p:nvPr>
+        </p:nvSpPr>
+        <p:spPr/>
+        <p:txBody>
+          <a:bodyPr/>
+          <a:lstStyle/>
+          <a:p>
+            <a:r>
+              <a:rPr lang="de-DE"/>
+              <a:t>Präsentationstitel</a:t>
+            </a:r>
+            <a:endParaRPr lang="de-DE" dirty="0"/>
+          </a:p>
+        </p:txBody>
+      </p:sp>
+      <p:sp>
+        <p:nvSpPr>
+          <p:cNvPr id="5" name="Datumsplatzhalter 4"/>
+          <p:cNvSpPr>
+            <a:spLocks noGrp="1"/>
+          </p:cNvSpPr>
+          <p:nvPr>
+            <p:ph type="dt" sz="quarter" idx="11"/>
+          </p:nvPr>
+        </p:nvSpPr>
+        <p:spPr/>
+        <p:txBody>
+          <a:bodyPr/>
+          <a:lstStyle/>
+          <a:p>
+            <a:fld id="{57D0303F-3DAF-4A6B-82D1-800CC55ACE37}" type="datetime1">
+              <a:rPr lang="de-DE" smtClean="0"/>
+              <a:t>10.11.2017</a:t>
+            </a:fld>
+            <a:endParaRPr lang="de-DE"/>
+          </a:p>
+        </p:txBody>
+      </p:sp>
+      <p:sp>
+        <p:nvSpPr>
+          <p:cNvPr id="6" name="Fußzeilenplatzhalter 5"/>
+          <p:cNvSpPr>
+            <a:spLocks noGrp="1"/>
+          </p:cNvSpPr>
+          <p:nvPr>
+            <p:ph type="ftr" sz="quarter" idx="12"/>
+          </p:nvPr>
+        </p:nvSpPr>
+        <p:spPr/>
+        <p:txBody>
+          <a:bodyPr/>
+          <a:lstStyle/>
+          <a:p>
+            <a:r>
+              <a:rPr lang="de-DE"/>
+              <a:t>Autor/Veranstaltung</a:t>
+            </a:r>
+            <a:endParaRPr lang="de-DE" dirty="0"/>
+          </a:p>
+        </p:txBody>
+      </p:sp>
+      <p:sp>
+        <p:nvSpPr>
+          <p:cNvPr id="7" name="Foliennummernplatzhalter 6"/>
+          <p:cNvSpPr>
+            <a:spLocks noGrp="1"/>
+          </p:cNvSpPr>
+          <p:nvPr>
+            <p:ph type="sldNum" sz="quarter" idx="13"/>
+          </p:nvPr>
+        </p:nvSpPr>
+        <p:spPr/>
+        <p:txBody>
+          <a:bodyPr/>
+          <a:lstStyle/>
+          <a:p>
+            <a:fld id="{B40210A4-2901-42F9-8CA9-E251F67383C7}" type="slidenum">
+              <a:rPr lang="de-DE" smtClean="0"/>
+              <a:t>7</a:t>
+            </a:fld>
+            <a:endParaRPr lang="de-DE"/>
+          </a:p>
+        </p:txBody>
+      </p:sp>
+    </p:spTree>
+    <p:extLst>
+      <p:ext uri="{BB962C8B-B14F-4D97-AF65-F5344CB8AC3E}">
+        <p14:creationId xmlns:p14="http://schemas.microsoft.com/office/powerpoint/2010/main" val="1763121639"/>
       </p:ext>
     </p:extLst>
   </p:cSld>
@@ -4568,7 +5357,7 @@
           <a:p>
             <a:fld id="{C056026F-1588-4FB1-8845-F95DAFF0F3E9}" type="datetime1">
               <a:rPr lang="de-DE" smtClean="0"/>
-              <a:t>09.11.2017</a:t>
+              <a:t>10.11.2017</a:t>
             </a:fld>
             <a:endParaRPr lang="de-DE"/>
           </a:p>
@@ -5089,7 +5878,7 @@
           <a:p>
             <a:fld id="{85E37377-EED6-47C3-9B1D-CF36F0FCD8B4}" type="datetime1">
               <a:rPr lang="de-DE" smtClean="0"/>
-              <a:t>09.11.2017</a:t>
+              <a:t>10.11.2017</a:t>
             </a:fld>
             <a:endParaRPr lang="de-DE"/>
           </a:p>
@@ -5356,7 +6145,7 @@
           <a:p>
             <a:fld id="{6B01E8E8-8A29-4D85-A2C3-6995032989B7}" type="datetime1">
               <a:rPr lang="de-DE" smtClean="0"/>
-              <a:t>09.11.2017</a:t>
+              <a:t>10.11.2017</a:t>
             </a:fld>
             <a:endParaRPr lang="de-DE"/>
           </a:p>
@@ -5623,7 +6412,7 @@
           <a:p>
             <a:fld id="{3CA6A51E-5224-4001-A6A1-6147DB41844D}" type="datetime1">
               <a:rPr lang="de-DE" smtClean="0"/>
-              <a:t>09.11.2017</a:t>
+              <a:t>10.11.2017</a:t>
             </a:fld>
             <a:endParaRPr lang="de-DE"/>
           </a:p>
@@ -5890,7 +6679,7 @@
           <a:p>
             <a:fld id="{0C1259EA-2A08-45BF-9248-C0AD7AEF30D3}" type="datetime1">
               <a:rPr lang="de-DE" smtClean="0"/>
-              <a:t>09.11.2017</a:t>
+              <a:t>10.11.2017</a:t>
             </a:fld>
             <a:endParaRPr lang="de-DE"/>
           </a:p>
@@ -6052,7 +6841,7 @@
           <a:p>
             <a:fld id="{0A2F6472-5AB0-4742-9C4D-F8F2B67B83AE}" type="datetime1">
               <a:rPr lang="de-DE" smtClean="0"/>
-              <a:t>09.11.2017</a:t>
+              <a:t>10.11.2017</a:t>
             </a:fld>
             <a:endParaRPr lang="de-DE"/>
           </a:p>
@@ -6150,7 +6939,7 @@
           <a:p>
             <a:fld id="{548F520C-6F56-480F-8597-220998799912}" type="datetime1">
               <a:rPr lang="de-DE" smtClean="0"/>
-              <a:t>09.11.2017</a:t>
+              <a:t>10.11.2017</a:t>
             </a:fld>
             <a:endParaRPr lang="de-DE"/>
           </a:p>
@@ -9447,7 +10236,7 @@
           <a:p>
             <a:fld id="{30A2658B-9DCA-4C61-BE60-88DEF3D1D478}" type="datetime1">
               <a:rPr lang="de-DE" smtClean="0"/>
-              <a:t>09.11.2017</a:t>
+              <a:t>10.11.2017</a:t>
             </a:fld>
             <a:endParaRPr lang="de-DE"/>
           </a:p>
@@ -9631,7 +10420,7 @@
           <a:p>
             <a:fld id="{EE1C2234-98B7-49F4-85EF-8DAF56499769}" type="datetime1">
               <a:rPr lang="de-DE" smtClean="0"/>
-              <a:t>09.11.2017</a:t>
+              <a:t>10.11.2017</a:t>
             </a:fld>
             <a:endParaRPr lang="de-DE"/>
           </a:p>
@@ -9813,7 +10602,7 @@
           <a:p>
             <a:fld id="{B5406BC5-04D9-4099-9923-D3D721330691}" type="datetime1">
               <a:rPr lang="de-DE" smtClean="0"/>
-              <a:t>09.11.2017</a:t>
+              <a:t>10.11.2017</a:t>
             </a:fld>
             <a:endParaRPr lang="de-DE"/>
           </a:p>
@@ -9990,7 +10779,7 @@
           <a:p>
             <a:fld id="{288921BD-6B3C-47BC-83C4-1C45CD0812D9}" type="datetime1">
               <a:rPr lang="de-DE" smtClean="0"/>
-              <a:t>09.11.2017</a:t>
+              <a:t>10.11.2017</a:t>
             </a:fld>
             <a:endParaRPr lang="de-DE"/>
           </a:p>
@@ -10268,7 +11057,7 @@
           <a:p>
             <a:fld id="{30A2658B-9DCA-4C61-BE60-88DEF3D1D478}" type="datetime1">
               <a:rPr lang="de-DE" smtClean="0"/>
-              <a:t>09.11.2017</a:t>
+              <a:t>10.11.2017</a:t>
             </a:fld>
             <a:endParaRPr lang="de-DE"/>
           </a:p>
@@ -13578,7 +14367,7 @@
           <a:p>
             <a:fld id="{5F1F23B7-A4E0-4A45-AADF-CD5A63F6F289}" type="datetime1">
               <a:rPr lang="de-DE" smtClean="0"/>
-              <a:t>09.11.2017</a:t>
+              <a:t>10.11.2017</a:t>
             </a:fld>
             <a:endParaRPr lang="de-DE"/>
           </a:p>
@@ -14014,7 +14803,7 @@
           <a:p>
             <a:fld id="{170EA310-62CF-4C13-8E83-90FE2584EEDC}" type="datetime1">
               <a:rPr lang="de-DE" smtClean="0"/>
-              <a:t>09.11.2017</a:t>
+              <a:t>10.11.2017</a:t>
             </a:fld>
             <a:endParaRPr lang="de-DE"/>
           </a:p>
@@ -14226,7 +15015,7 @@
           <a:p>
             <a:fld id="{FB10439F-E434-4863-9F94-40224B9CDFEB}" type="datetime1">
               <a:rPr lang="de-DE" smtClean="0"/>
-              <a:t>09.11.2017</a:t>
+              <a:t>10.11.2017</a:t>
             </a:fld>
             <a:endParaRPr lang="de-DE"/>
           </a:p>
@@ -14450,7 +15239,7 @@
           <a:p>
             <a:fld id="{315826E6-14F6-4DCD-8A58-C4BA917EDB34}" type="datetime1">
               <a:rPr lang="de-DE" smtClean="0"/>
-              <a:t>09.11.2017</a:t>
+              <a:t>10.11.2017</a:t>
             </a:fld>
             <a:endParaRPr lang="de-DE"/>
           </a:p>
@@ -14675,7 +15464,7 @@
           <a:p>
             <a:fld id="{4073110B-FC60-4FAB-ACE1-146858AC5C12}" type="datetime1">
               <a:rPr lang="de-DE" smtClean="0"/>
-              <a:t>09.11.2017</a:t>
+              <a:t>10.11.2017</a:t>
             </a:fld>
             <a:endParaRPr lang="de-DE"/>
           </a:p>
@@ -14957,7 +15746,7 @@
           <a:p>
             <a:fld id="{34409F38-DEF5-4898-9CDF-BDB6157DFE11}" type="datetime1">
               <a:rPr lang="de-DE" smtClean="0"/>
-              <a:t>09.11.2017</a:t>
+              <a:t>10.11.2017</a:t>
             </a:fld>
             <a:endParaRPr lang="de-DE"/>
           </a:p>
@@ -15174,7 +15963,7 @@
           <a:p>
             <a:fld id="{30A2658B-9DCA-4C61-BE60-88DEF3D1D478}" type="datetime1">
               <a:rPr lang="de-DE" smtClean="0"/>
-              <a:t>09.11.2017</a:t>
+              <a:t>10.11.2017</a:t>
             </a:fld>
             <a:endParaRPr lang="de-DE"/>
           </a:p>
@@ -18788,6 +19577,21 @@
             </a:pPr>
             <a:r>
               <a:rPr lang="en-US" dirty="0"/>
+              <a:t>Pandas </a:t>
+            </a:r>
+            <a:r>
+              <a:rPr lang="en-US" dirty="0" err="1"/>
+              <a:t>DataFrame</a:t>
+            </a:r>
+            <a:endParaRPr lang="en-US" dirty="0"/>
+          </a:p>
+          <a:p>
+            <a:pPr>
+              <a:buFontTx/>
+              <a:buChar char="-"/>
+            </a:pPr>
+            <a:r>
+              <a:rPr lang="en-US" dirty="0"/>
               <a:t>Used Libraries:</a:t>
             </a:r>
           </a:p>
@@ -18852,7 +19656,7 @@
           <a:p>
             <a:fld id="{288921BD-6B3C-47BC-83C4-1C45CD0812D9}" type="datetime1">
               <a:rPr lang="de-DE" smtClean="0"/>
-              <a:t>09.11.2017</a:t>
+              <a:t>10.11.2017</a:t>
             </a:fld>
             <a:endParaRPr lang="de-DE"/>
           </a:p>
@@ -19752,6 +20556,1470 @@
       </p:grpSpPr>
       <p:sp>
         <p:nvSpPr>
+          <p:cNvPr id="2" name="Titel 1"/>
+          <p:cNvSpPr>
+            <a:spLocks noGrp="1"/>
+          </p:cNvSpPr>
+          <p:nvPr>
+            <p:ph type="title"/>
+          </p:nvPr>
+        </p:nvSpPr>
+        <p:spPr/>
+        <p:txBody>
+          <a:bodyPr/>
+          <a:lstStyle/>
+          <a:p>
+            <a:r>
+              <a:rPr lang="en-US" dirty="0"/>
+              <a:t>Used Technologies</a:t>
+            </a:r>
+            <a:endParaRPr lang="de-DE" dirty="0"/>
+          </a:p>
+        </p:txBody>
+      </p:sp>
+      <p:sp>
+        <p:nvSpPr>
+          <p:cNvPr id="4" name="Datumsplatzhalter 3"/>
+          <p:cNvSpPr>
+            <a:spLocks noGrp="1"/>
+          </p:cNvSpPr>
+          <p:nvPr>
+            <p:ph type="dt" sz="half" idx="10"/>
+          </p:nvPr>
+        </p:nvSpPr>
+        <p:spPr/>
+        <p:txBody>
+          <a:bodyPr/>
+          <a:lstStyle/>
+          <a:p>
+            <a:fld id="{288921BD-6B3C-47BC-83C4-1C45CD0812D9}" type="datetime1">
+              <a:rPr lang="de-DE" smtClean="0"/>
+              <a:t>10.11.2017</a:t>
+            </a:fld>
+            <a:endParaRPr lang="de-DE"/>
+          </a:p>
+        </p:txBody>
+      </p:sp>
+      <p:sp>
+        <p:nvSpPr>
+          <p:cNvPr id="5" name="Fußzeilenplatzhalter 4"/>
+          <p:cNvSpPr>
+            <a:spLocks noGrp="1"/>
+          </p:cNvSpPr>
+          <p:nvPr>
+            <p:ph type="ftr" sz="quarter" idx="11"/>
+          </p:nvPr>
+        </p:nvSpPr>
+        <p:spPr/>
+        <p:txBody>
+          <a:bodyPr/>
+          <a:lstStyle/>
+          <a:p>
+            <a:r>
+              <a:rPr lang="en-US" dirty="0"/>
+              <a:t>ILAS </a:t>
+            </a:r>
+            <a:r>
+              <a:rPr lang="en-US" dirty="0" err="1"/>
+              <a:t>Excersise</a:t>
+            </a:r>
+            <a:r>
+              <a:rPr lang="en-US" dirty="0"/>
+              <a:t> 2 / Group 20 / WS1718</a:t>
+            </a:r>
+          </a:p>
+        </p:txBody>
+      </p:sp>
+      <p:sp>
+        <p:nvSpPr>
+          <p:cNvPr id="6" name="Foliennummernplatzhalter 5"/>
+          <p:cNvSpPr>
+            <a:spLocks noGrp="1"/>
+          </p:cNvSpPr>
+          <p:nvPr>
+            <p:ph type="sldNum" sz="quarter" idx="12"/>
+          </p:nvPr>
+        </p:nvSpPr>
+        <p:spPr/>
+        <p:txBody>
+          <a:bodyPr/>
+          <a:lstStyle/>
+          <a:p>
+            <a:fld id="{527F1E04-A1A3-475C-A843-CFD0985386EF}" type="slidenum">
+              <a:rPr lang="de-DE" smtClean="0"/>
+              <a:t>3</a:t>
+            </a:fld>
+            <a:endParaRPr lang="de-DE"/>
+          </a:p>
+        </p:txBody>
+      </p:sp>
+      <p:pic>
+        <p:nvPicPr>
+          <p:cNvPr id="11" name="Grafik 10">
+            <a:extLst>
+              <a:ext uri="{FF2B5EF4-FFF2-40B4-BE49-F238E27FC236}">
+                <a16:creationId xmlns:a16="http://schemas.microsoft.com/office/drawing/2014/main" id="{8FB45E69-D1C9-47EE-A541-EB0F55EF1231}"/>
+              </a:ext>
+            </a:extLst>
+          </p:cNvPr>
+          <p:cNvPicPr>
+            <a:picLocks noChangeAspect="1"/>
+          </p:cNvPicPr>
+          <p:nvPr/>
+        </p:nvPicPr>
+        <p:blipFill>
+          <a:blip r:embed="rId3">
+            <a:extLst>
+              <a:ext uri="{28A0092B-C50C-407E-A947-70E740481C1C}">
+                <a14:useLocalDpi xmlns:a14="http://schemas.microsoft.com/office/drawing/2010/main" val="0"/>
+              </a:ext>
+            </a:extLst>
+          </a:blip>
+          <a:stretch>
+            <a:fillRect/>
+          </a:stretch>
+        </p:blipFill>
+        <p:spPr>
+          <a:xfrm>
+            <a:off x="627575" y="1053476"/>
+            <a:ext cx="7961313" cy="2986711"/>
+          </a:xfrm>
+          <a:prstGeom prst="rect">
+            <a:avLst/>
+          </a:prstGeom>
+        </p:spPr>
+      </p:pic>
+      <p:sp>
+        <p:nvSpPr>
+          <p:cNvPr id="12" name="Textfeld 11">
+            <a:extLst>
+              <a:ext uri="{FF2B5EF4-FFF2-40B4-BE49-F238E27FC236}">
+                <a16:creationId xmlns:a16="http://schemas.microsoft.com/office/drawing/2014/main" id="{81950DF1-68FA-4F65-8E76-45660A4067F2}"/>
+              </a:ext>
+            </a:extLst>
+          </p:cNvPr>
+          <p:cNvSpPr txBox="1"/>
+          <p:nvPr/>
+        </p:nvSpPr>
+        <p:spPr>
+          <a:xfrm>
+            <a:off x="1331912" y="4497387"/>
+            <a:ext cx="5574026" cy="215444"/>
+          </a:xfrm>
+          <a:prstGeom prst="rect">
+            <a:avLst/>
+          </a:prstGeom>
+          <a:noFill/>
+        </p:spPr>
+        <p:txBody>
+          <a:bodyPr wrap="none" lIns="0" tIns="0" rIns="0" bIns="0" rtlCol="0">
+            <a:spAutoFit/>
+          </a:bodyPr>
+          <a:lstStyle/>
+          <a:p>
+            <a:pPr marL="216000" indent="-216000">
+              <a:spcAft>
+                <a:spcPts val="420"/>
+              </a:spcAft>
+              <a:buFont typeface="Calibri" panose="020F0502020204030204" pitchFamily="34" charset="0"/>
+              <a:buChar char="−"/>
+            </a:pPr>
+            <a:r>
+              <a:rPr lang="en-US" sz="1400" dirty="0">
+                <a:solidFill>
+                  <a:schemeClr val="accent2"/>
+                </a:solidFill>
+              </a:rPr>
+              <a:t>Accuracy: 0.853 (Depth 3) 		Accuracy: 0.922 (Depth 7)</a:t>
+            </a:r>
+            <a:endParaRPr lang="de-DE" sz="1400" dirty="0" err="1">
+              <a:solidFill>
+                <a:schemeClr val="accent2"/>
+              </a:solidFill>
+            </a:endParaRPr>
+          </a:p>
+        </p:txBody>
+      </p:sp>
+    </p:spTree>
+    <p:extLst>
+      <p:ext uri="{BB962C8B-B14F-4D97-AF65-F5344CB8AC3E}">
+        <p14:creationId xmlns:p14="http://schemas.microsoft.com/office/powerpoint/2010/main" val="3429370262"/>
+      </p:ext>
+    </p:extLst>
+  </p:cSld>
+  <p:clrMapOvr>
+    <a:masterClrMapping/>
+  </p:clrMapOvr>
+</p:sld>
+</file>
+
+<file path=ppt/slides/slide4.xml><?xml version="1.0" encoding="utf-8"?>
+<p:sld xmlns:a="http://schemas.openxmlformats.org/drawingml/2006/main" xmlns:r="http://schemas.openxmlformats.org/officeDocument/2006/relationships" xmlns:p="http://schemas.openxmlformats.org/presentationml/2006/main">
+  <p:cSld>
+    <p:spTree>
+      <p:nvGrpSpPr>
+        <p:cNvPr id="1" name=""/>
+        <p:cNvGrpSpPr/>
+        <p:nvPr/>
+      </p:nvGrpSpPr>
+      <p:grpSpPr>
+        <a:xfrm>
+          <a:off x="0" y="0"/>
+          <a:ext cx="0" cy="0"/>
+          <a:chOff x="0" y="0"/>
+          <a:chExt cx="0" cy="0"/>
+        </a:xfrm>
+      </p:grpSpPr>
+      <p:sp>
+        <p:nvSpPr>
+          <p:cNvPr id="4" name="Titel 3"/>
+          <p:cNvSpPr>
+            <a:spLocks noGrp="1"/>
+          </p:cNvSpPr>
+          <p:nvPr>
+            <p:ph type="title"/>
+          </p:nvPr>
+        </p:nvSpPr>
+        <p:spPr/>
+        <p:txBody>
+          <a:bodyPr/>
+          <a:lstStyle/>
+          <a:p>
+            <a:r>
+              <a:rPr lang="en-US" dirty="0"/>
+              <a:t>Google Scholar Search</a:t>
+            </a:r>
+            <a:endParaRPr lang="de-DE" dirty="0"/>
+          </a:p>
+        </p:txBody>
+      </p:sp>
+      <p:sp>
+        <p:nvSpPr>
+          <p:cNvPr id="6" name="Textfeld 5">
+            <a:extLst>
+              <a:ext uri="{FF2B5EF4-FFF2-40B4-BE49-F238E27FC236}">
+                <a16:creationId xmlns:a16="http://schemas.microsoft.com/office/drawing/2014/main" id="{654895FD-D8A2-4BB2-BCA0-5B31FDBE5764}"/>
+              </a:ext>
+            </a:extLst>
+          </p:cNvPr>
+          <p:cNvSpPr txBox="1"/>
+          <p:nvPr/>
+        </p:nvSpPr>
+        <p:spPr>
+          <a:xfrm>
+            <a:off x="3922712" y="1650206"/>
+            <a:ext cx="835165" cy="215444"/>
+          </a:xfrm>
+          <a:prstGeom prst="rect">
+            <a:avLst/>
+          </a:prstGeom>
+          <a:noFill/>
+        </p:spPr>
+        <p:txBody>
+          <a:bodyPr wrap="none" lIns="0" tIns="0" rIns="0" bIns="0" rtlCol="0">
+            <a:spAutoFit/>
+          </a:bodyPr>
+          <a:lstStyle/>
+          <a:p>
+            <a:pPr>
+              <a:spcAft>
+                <a:spcPts val="420"/>
+              </a:spcAft>
+            </a:pPr>
+            <a:r>
+              <a:rPr lang="en-US" sz="1400" dirty="0">
+                <a:solidFill>
+                  <a:schemeClr val="accent2"/>
+                </a:solidFill>
+              </a:rPr>
+              <a:t>APP: 23100</a:t>
+            </a:r>
+            <a:endParaRPr lang="de-DE" sz="1400" dirty="0" err="1">
+              <a:solidFill>
+                <a:schemeClr val="accent2"/>
+              </a:solidFill>
+            </a:endParaRPr>
+          </a:p>
+        </p:txBody>
+      </p:sp>
+      <p:sp>
+        <p:nvSpPr>
+          <p:cNvPr id="7" name="Textfeld 6">
+            <a:extLst>
+              <a:ext uri="{FF2B5EF4-FFF2-40B4-BE49-F238E27FC236}">
+                <a16:creationId xmlns:a16="http://schemas.microsoft.com/office/drawing/2014/main" id="{B7E84CBE-171C-4610-9562-FAE97594FF5A}"/>
+              </a:ext>
+            </a:extLst>
+          </p:cNvPr>
+          <p:cNvSpPr txBox="1"/>
+          <p:nvPr/>
+        </p:nvSpPr>
+        <p:spPr>
+          <a:xfrm>
+            <a:off x="2293387" y="1952839"/>
+            <a:ext cx="626775" cy="215444"/>
+          </a:xfrm>
+          <a:prstGeom prst="rect">
+            <a:avLst/>
+          </a:prstGeom>
+          <a:noFill/>
+        </p:spPr>
+        <p:txBody>
+          <a:bodyPr wrap="square" lIns="0" tIns="0" rIns="0" bIns="0" rtlCol="0">
+            <a:spAutoFit/>
+          </a:bodyPr>
+          <a:lstStyle/>
+          <a:p>
+            <a:pPr>
+              <a:spcAft>
+                <a:spcPts val="420"/>
+              </a:spcAft>
+            </a:pPr>
+            <a:r>
+              <a:rPr lang="en-US" sz="1400" dirty="0">
+                <a:solidFill>
+                  <a:schemeClr val="accent2"/>
+                </a:solidFill>
+              </a:rPr>
+              <a:t>S6: 3600</a:t>
+            </a:r>
+            <a:endParaRPr lang="de-DE" sz="1400" dirty="0" err="1">
+              <a:solidFill>
+                <a:schemeClr val="accent2"/>
+              </a:solidFill>
+            </a:endParaRPr>
+          </a:p>
+        </p:txBody>
+      </p:sp>
+      <p:sp>
+        <p:nvSpPr>
+          <p:cNvPr id="8" name="Textfeld 7">
+            <a:extLst>
+              <a:ext uri="{FF2B5EF4-FFF2-40B4-BE49-F238E27FC236}">
+                <a16:creationId xmlns:a16="http://schemas.microsoft.com/office/drawing/2014/main" id="{BE8B5660-C3EF-413A-AF5E-6F1E1A5ECDB6}"/>
+              </a:ext>
+            </a:extLst>
+          </p:cNvPr>
+          <p:cNvSpPr txBox="1"/>
+          <p:nvPr/>
+        </p:nvSpPr>
+        <p:spPr>
+          <a:xfrm>
+            <a:off x="5808704" y="1952839"/>
+            <a:ext cx="910506" cy="215444"/>
+          </a:xfrm>
+          <a:prstGeom prst="rect">
+            <a:avLst/>
+          </a:prstGeom>
+          <a:noFill/>
+        </p:spPr>
+        <p:txBody>
+          <a:bodyPr wrap="none" lIns="0" tIns="0" rIns="0" bIns="0" rtlCol="0">
+            <a:spAutoFit/>
+          </a:bodyPr>
+          <a:lstStyle/>
+          <a:p>
+            <a:pPr>
+              <a:spcAft>
+                <a:spcPts val="420"/>
+              </a:spcAft>
+            </a:pPr>
+            <a:r>
+              <a:rPr lang="en-US" sz="1400" dirty="0">
+                <a:solidFill>
+                  <a:schemeClr val="accent2"/>
+                </a:solidFill>
+              </a:rPr>
+              <a:t>AMPKA: 839</a:t>
+            </a:r>
+            <a:endParaRPr lang="de-DE" sz="1400" dirty="0" err="1">
+              <a:solidFill>
+                <a:schemeClr val="accent2"/>
+              </a:solidFill>
+            </a:endParaRPr>
+          </a:p>
+        </p:txBody>
+      </p:sp>
+      <p:sp>
+        <p:nvSpPr>
+          <p:cNvPr id="9" name="Textfeld 8">
+            <a:extLst>
+              <a:ext uri="{FF2B5EF4-FFF2-40B4-BE49-F238E27FC236}">
+                <a16:creationId xmlns:a16="http://schemas.microsoft.com/office/drawing/2014/main" id="{5E057A08-65F8-4EBC-A8A0-67B0D6C18D4A}"/>
+              </a:ext>
+            </a:extLst>
+          </p:cNvPr>
+          <p:cNvSpPr txBox="1"/>
+          <p:nvPr/>
+        </p:nvSpPr>
+        <p:spPr>
+          <a:xfrm>
+            <a:off x="1387690" y="2521965"/>
+            <a:ext cx="905697" cy="215444"/>
+          </a:xfrm>
+          <a:prstGeom prst="rect">
+            <a:avLst/>
+          </a:prstGeom>
+          <a:noFill/>
+        </p:spPr>
+        <p:txBody>
+          <a:bodyPr wrap="square" lIns="0" tIns="0" rIns="0" bIns="0" rtlCol="0">
+            <a:spAutoFit/>
+          </a:bodyPr>
+          <a:lstStyle/>
+          <a:p>
+            <a:pPr>
+              <a:spcAft>
+                <a:spcPts val="420"/>
+              </a:spcAft>
+            </a:pPr>
+            <a:r>
+              <a:rPr lang="en-US" sz="1400" dirty="0">
+                <a:solidFill>
+                  <a:schemeClr val="accent2"/>
+                </a:solidFill>
+              </a:rPr>
+              <a:t>pP70S6: 161</a:t>
+            </a:r>
+            <a:endParaRPr lang="de-DE" sz="1400" dirty="0" err="1">
+              <a:solidFill>
+                <a:schemeClr val="accent2"/>
+              </a:solidFill>
+            </a:endParaRPr>
+          </a:p>
+        </p:txBody>
+      </p:sp>
+      <p:sp>
+        <p:nvSpPr>
+          <p:cNvPr id="10" name="Textfeld 9">
+            <a:extLst>
+              <a:ext uri="{FF2B5EF4-FFF2-40B4-BE49-F238E27FC236}">
+                <a16:creationId xmlns:a16="http://schemas.microsoft.com/office/drawing/2014/main" id="{E345F6E2-8657-4D3E-BC3D-A4BEEAB80BD9}"/>
+              </a:ext>
+            </a:extLst>
+          </p:cNvPr>
+          <p:cNvSpPr txBox="1"/>
+          <p:nvPr/>
+        </p:nvSpPr>
+        <p:spPr>
+          <a:xfrm>
+            <a:off x="2914058" y="2478110"/>
+            <a:ext cx="833113" cy="215444"/>
+          </a:xfrm>
+          <a:prstGeom prst="rect">
+            <a:avLst/>
+          </a:prstGeom>
+          <a:noFill/>
+        </p:spPr>
+        <p:txBody>
+          <a:bodyPr wrap="square" lIns="0" tIns="0" rIns="0" bIns="0" rtlCol="0">
+            <a:spAutoFit/>
+          </a:bodyPr>
+          <a:lstStyle/>
+          <a:p>
+            <a:pPr>
+              <a:spcAft>
+                <a:spcPts val="420"/>
+              </a:spcAft>
+            </a:pPr>
+            <a:r>
+              <a:rPr lang="en-US" sz="1400" dirty="0">
+                <a:solidFill>
+                  <a:schemeClr val="accent2"/>
+                </a:solidFill>
+              </a:rPr>
+              <a:t>PKCA: 3530</a:t>
+            </a:r>
+            <a:endParaRPr lang="de-DE" sz="1400" dirty="0" err="1">
+              <a:solidFill>
+                <a:schemeClr val="accent2"/>
+              </a:solidFill>
+            </a:endParaRPr>
+          </a:p>
+        </p:txBody>
+      </p:sp>
+      <p:sp>
+        <p:nvSpPr>
+          <p:cNvPr id="11" name="Textfeld 10">
+            <a:extLst>
+              <a:ext uri="{FF2B5EF4-FFF2-40B4-BE49-F238E27FC236}">
+                <a16:creationId xmlns:a16="http://schemas.microsoft.com/office/drawing/2014/main" id="{E64FA043-0AC6-4B5A-986C-5A1550B48748}"/>
+              </a:ext>
+            </a:extLst>
+          </p:cNvPr>
+          <p:cNvSpPr txBox="1"/>
+          <p:nvPr/>
+        </p:nvSpPr>
+        <p:spPr>
+          <a:xfrm>
+            <a:off x="4854474" y="2478110"/>
+            <a:ext cx="955967" cy="215444"/>
+          </a:xfrm>
+          <a:prstGeom prst="rect">
+            <a:avLst/>
+          </a:prstGeom>
+          <a:noFill/>
+        </p:spPr>
+        <p:txBody>
+          <a:bodyPr wrap="none" lIns="0" tIns="0" rIns="0" bIns="0" rtlCol="0">
+            <a:spAutoFit/>
+          </a:bodyPr>
+          <a:lstStyle/>
+          <a:p>
+            <a:pPr>
+              <a:spcAft>
+                <a:spcPts val="420"/>
+              </a:spcAft>
+            </a:pPr>
+            <a:r>
+              <a:rPr lang="en-US" sz="1400" dirty="0">
+                <a:solidFill>
+                  <a:schemeClr val="accent2"/>
+                </a:solidFill>
+              </a:rPr>
+              <a:t>RAPTOR: 255</a:t>
+            </a:r>
+            <a:endParaRPr lang="de-DE" sz="1400" dirty="0" err="1">
+              <a:solidFill>
+                <a:schemeClr val="accent2"/>
+              </a:solidFill>
+            </a:endParaRPr>
+          </a:p>
+        </p:txBody>
+      </p:sp>
+      <p:sp>
+        <p:nvSpPr>
+          <p:cNvPr id="12" name="Textfeld 11">
+            <a:extLst>
+              <a:ext uri="{FF2B5EF4-FFF2-40B4-BE49-F238E27FC236}">
+                <a16:creationId xmlns:a16="http://schemas.microsoft.com/office/drawing/2014/main" id="{B4D2F961-5006-432B-9261-50C042740BA2}"/>
+              </a:ext>
+            </a:extLst>
+          </p:cNvPr>
+          <p:cNvSpPr txBox="1"/>
+          <p:nvPr/>
+        </p:nvSpPr>
+        <p:spPr>
+          <a:xfrm>
+            <a:off x="7333908" y="2414243"/>
+            <a:ext cx="856004" cy="215444"/>
+          </a:xfrm>
+          <a:prstGeom prst="rect">
+            <a:avLst/>
+          </a:prstGeom>
+          <a:noFill/>
+        </p:spPr>
+        <p:txBody>
+          <a:bodyPr wrap="none" lIns="0" tIns="0" rIns="0" bIns="0" rtlCol="0">
+            <a:spAutoFit/>
+          </a:bodyPr>
+          <a:lstStyle/>
+          <a:p>
+            <a:pPr>
+              <a:spcAft>
+                <a:spcPts val="420"/>
+              </a:spcAft>
+            </a:pPr>
+            <a:r>
+              <a:rPr lang="en-US" sz="1400" dirty="0">
+                <a:solidFill>
+                  <a:schemeClr val="accent2"/>
+                </a:solidFill>
+              </a:rPr>
+              <a:t>SOD1: 2160</a:t>
+            </a:r>
+            <a:endParaRPr lang="de-DE" sz="1400" dirty="0" err="1">
+              <a:solidFill>
+                <a:schemeClr val="accent2"/>
+              </a:solidFill>
+            </a:endParaRPr>
+          </a:p>
+        </p:txBody>
+      </p:sp>
+      <p:sp>
+        <p:nvSpPr>
+          <p:cNvPr id="13" name="Textfeld 12">
+            <a:extLst>
+              <a:ext uri="{FF2B5EF4-FFF2-40B4-BE49-F238E27FC236}">
+                <a16:creationId xmlns:a16="http://schemas.microsoft.com/office/drawing/2014/main" id="{CE4A8F11-056E-45FC-9078-6AAAB608E6D5}"/>
+              </a:ext>
+            </a:extLst>
+          </p:cNvPr>
+          <p:cNvSpPr txBox="1"/>
+          <p:nvPr/>
+        </p:nvSpPr>
+        <p:spPr>
+          <a:xfrm>
+            <a:off x="722312" y="3031721"/>
+            <a:ext cx="710131" cy="215444"/>
+          </a:xfrm>
+          <a:prstGeom prst="rect">
+            <a:avLst/>
+          </a:prstGeom>
+          <a:noFill/>
+        </p:spPr>
+        <p:txBody>
+          <a:bodyPr wrap="square" lIns="0" tIns="0" rIns="0" bIns="0" rtlCol="0">
+            <a:spAutoFit/>
+          </a:bodyPr>
+          <a:lstStyle/>
+          <a:p>
+            <a:pPr>
+              <a:spcAft>
+                <a:spcPts val="420"/>
+              </a:spcAft>
+            </a:pPr>
+            <a:r>
+              <a:rPr lang="en-US" sz="1400" dirty="0">
+                <a:solidFill>
+                  <a:schemeClr val="accent2"/>
+                </a:solidFill>
+              </a:rPr>
+              <a:t>GluR3: 72</a:t>
+            </a:r>
+            <a:endParaRPr lang="de-DE" sz="1400" dirty="0" err="1">
+              <a:solidFill>
+                <a:schemeClr val="accent2"/>
+              </a:solidFill>
+            </a:endParaRPr>
+          </a:p>
+        </p:txBody>
+      </p:sp>
+      <p:sp>
+        <p:nvSpPr>
+          <p:cNvPr id="14" name="Textfeld 13">
+            <a:extLst>
+              <a:ext uri="{FF2B5EF4-FFF2-40B4-BE49-F238E27FC236}">
+                <a16:creationId xmlns:a16="http://schemas.microsoft.com/office/drawing/2014/main" id="{0EF2C466-2C19-4C69-AA90-AB7F8AB64662}"/>
+              </a:ext>
+            </a:extLst>
+          </p:cNvPr>
+          <p:cNvSpPr txBox="1"/>
+          <p:nvPr/>
+        </p:nvSpPr>
+        <p:spPr>
+          <a:xfrm>
+            <a:off x="2235744" y="3062743"/>
+            <a:ext cx="843180" cy="215444"/>
+          </a:xfrm>
+          <a:prstGeom prst="rect">
+            <a:avLst/>
+          </a:prstGeom>
+          <a:noFill/>
+        </p:spPr>
+        <p:txBody>
+          <a:bodyPr wrap="square" lIns="0" tIns="0" rIns="0" bIns="0" rtlCol="0">
+            <a:spAutoFit/>
+          </a:bodyPr>
+          <a:lstStyle/>
+          <a:p>
+            <a:pPr>
+              <a:spcAft>
+                <a:spcPts val="420"/>
+              </a:spcAft>
+            </a:pPr>
+            <a:r>
+              <a:rPr lang="en-US" sz="1400" dirty="0">
+                <a:solidFill>
+                  <a:schemeClr val="accent2"/>
+                </a:solidFill>
+              </a:rPr>
+              <a:t>pGSK3B: 19</a:t>
+            </a:r>
+            <a:endParaRPr lang="de-DE" sz="1400" dirty="0" err="1">
+              <a:solidFill>
+                <a:schemeClr val="accent2"/>
+              </a:solidFill>
+            </a:endParaRPr>
+          </a:p>
+        </p:txBody>
+      </p:sp>
+      <p:sp>
+        <p:nvSpPr>
+          <p:cNvPr id="15" name="Textfeld 14">
+            <a:extLst>
+              <a:ext uri="{FF2B5EF4-FFF2-40B4-BE49-F238E27FC236}">
+                <a16:creationId xmlns:a16="http://schemas.microsoft.com/office/drawing/2014/main" id="{23650CB0-DB48-4211-B9E0-77EF6A07EE81}"/>
+              </a:ext>
+            </a:extLst>
+          </p:cNvPr>
+          <p:cNvSpPr txBox="1"/>
+          <p:nvPr/>
+        </p:nvSpPr>
+        <p:spPr>
+          <a:xfrm>
+            <a:off x="3617912" y="3035717"/>
+            <a:ext cx="745397" cy="215444"/>
+          </a:xfrm>
+          <a:prstGeom prst="rect">
+            <a:avLst/>
+          </a:prstGeom>
+          <a:noFill/>
+        </p:spPr>
+        <p:txBody>
+          <a:bodyPr wrap="square" lIns="0" tIns="0" rIns="0" bIns="0" rtlCol="0">
+            <a:spAutoFit/>
+          </a:bodyPr>
+          <a:lstStyle/>
+          <a:p>
+            <a:pPr>
+              <a:spcAft>
+                <a:spcPts val="420"/>
+              </a:spcAft>
+            </a:pPr>
+            <a:r>
+              <a:rPr lang="en-US" sz="1400" dirty="0" err="1">
+                <a:solidFill>
+                  <a:schemeClr val="accent2"/>
+                </a:solidFill>
+              </a:rPr>
+              <a:t>pCREB</a:t>
+            </a:r>
+            <a:r>
+              <a:rPr lang="en-US" sz="1400" dirty="0">
+                <a:solidFill>
+                  <a:schemeClr val="accent2"/>
+                </a:solidFill>
+              </a:rPr>
+              <a:t>: 76</a:t>
+            </a:r>
+            <a:endParaRPr lang="de-DE" sz="1400" dirty="0" err="1">
+              <a:solidFill>
+                <a:schemeClr val="accent2"/>
+              </a:solidFill>
+            </a:endParaRPr>
+          </a:p>
+        </p:txBody>
+      </p:sp>
+      <p:sp>
+        <p:nvSpPr>
+          <p:cNvPr id="16" name="Textfeld 15">
+            <a:extLst>
+              <a:ext uri="{FF2B5EF4-FFF2-40B4-BE49-F238E27FC236}">
+                <a16:creationId xmlns:a16="http://schemas.microsoft.com/office/drawing/2014/main" id="{69F0FE0B-863E-498E-9D04-54A38A5E5BE7}"/>
+              </a:ext>
+            </a:extLst>
+          </p:cNvPr>
+          <p:cNvSpPr txBox="1"/>
+          <p:nvPr/>
+        </p:nvSpPr>
+        <p:spPr>
+          <a:xfrm>
+            <a:off x="5482781" y="3031954"/>
+            <a:ext cx="1030731" cy="215444"/>
+          </a:xfrm>
+          <a:prstGeom prst="rect">
+            <a:avLst/>
+          </a:prstGeom>
+          <a:noFill/>
+        </p:spPr>
+        <p:txBody>
+          <a:bodyPr wrap="none" lIns="0" tIns="0" rIns="0" bIns="0" rtlCol="0">
+            <a:spAutoFit/>
+          </a:bodyPr>
+          <a:lstStyle/>
+          <a:p>
+            <a:pPr>
+              <a:spcAft>
+                <a:spcPts val="420"/>
+              </a:spcAft>
+            </a:pPr>
+            <a:r>
+              <a:rPr lang="en-US" sz="1400" dirty="0" err="1">
+                <a:solidFill>
+                  <a:schemeClr val="accent2"/>
+                </a:solidFill>
+              </a:rPr>
+              <a:t>pNUMB</a:t>
+            </a:r>
+            <a:r>
+              <a:rPr lang="en-US" sz="1400" dirty="0">
+                <a:solidFill>
+                  <a:schemeClr val="accent2"/>
+                </a:solidFill>
+              </a:rPr>
+              <a:t>: 1270</a:t>
+            </a:r>
+            <a:endParaRPr lang="de-DE" sz="1400" dirty="0" err="1">
+              <a:solidFill>
+                <a:schemeClr val="accent2"/>
+              </a:solidFill>
+            </a:endParaRPr>
+          </a:p>
+        </p:txBody>
+      </p:sp>
+      <p:sp>
+        <p:nvSpPr>
+          <p:cNvPr id="17" name="Textfeld 16">
+            <a:extLst>
+              <a:ext uri="{FF2B5EF4-FFF2-40B4-BE49-F238E27FC236}">
+                <a16:creationId xmlns:a16="http://schemas.microsoft.com/office/drawing/2014/main" id="{EBA71058-09F1-403B-A55F-10754C3FE33A}"/>
+              </a:ext>
+            </a:extLst>
+          </p:cNvPr>
+          <p:cNvSpPr txBox="1"/>
+          <p:nvPr/>
+        </p:nvSpPr>
+        <p:spPr>
+          <a:xfrm>
+            <a:off x="6850945" y="3031721"/>
+            <a:ext cx="729367" cy="215444"/>
+          </a:xfrm>
+          <a:prstGeom prst="rect">
+            <a:avLst/>
+          </a:prstGeom>
+          <a:noFill/>
+        </p:spPr>
+        <p:txBody>
+          <a:bodyPr wrap="none" lIns="0" tIns="0" rIns="0" bIns="0" rtlCol="0">
+            <a:spAutoFit/>
+          </a:bodyPr>
+          <a:lstStyle/>
+          <a:p>
+            <a:pPr>
+              <a:spcAft>
+                <a:spcPts val="420"/>
+              </a:spcAft>
+            </a:pPr>
+            <a:r>
+              <a:rPr lang="en-US" sz="1400" dirty="0">
+                <a:solidFill>
+                  <a:schemeClr val="accent2"/>
+                </a:solidFill>
+              </a:rPr>
+              <a:t>P38: 3620</a:t>
+            </a:r>
+            <a:endParaRPr lang="de-DE" sz="1400" dirty="0" err="1">
+              <a:solidFill>
+                <a:schemeClr val="accent2"/>
+              </a:solidFill>
+            </a:endParaRPr>
+          </a:p>
+        </p:txBody>
+      </p:sp>
+      <p:sp>
+        <p:nvSpPr>
+          <p:cNvPr id="18" name="Textfeld 17">
+            <a:extLst>
+              <a:ext uri="{FF2B5EF4-FFF2-40B4-BE49-F238E27FC236}">
+                <a16:creationId xmlns:a16="http://schemas.microsoft.com/office/drawing/2014/main" id="{D168792E-E0DE-4008-9AF4-FC8CD23190EF}"/>
+              </a:ext>
+            </a:extLst>
+          </p:cNvPr>
+          <p:cNvSpPr txBox="1"/>
+          <p:nvPr/>
+        </p:nvSpPr>
+        <p:spPr>
+          <a:xfrm>
+            <a:off x="7855561" y="3031721"/>
+            <a:ext cx="1020151" cy="215444"/>
+          </a:xfrm>
+          <a:prstGeom prst="rect">
+            <a:avLst/>
+          </a:prstGeom>
+          <a:noFill/>
+        </p:spPr>
+        <p:txBody>
+          <a:bodyPr wrap="none" lIns="0" tIns="0" rIns="0" bIns="0" rtlCol="0">
+            <a:spAutoFit/>
+          </a:bodyPr>
+          <a:lstStyle/>
+          <a:p>
+            <a:pPr>
+              <a:spcAft>
+                <a:spcPts val="420"/>
+              </a:spcAft>
+            </a:pPr>
+            <a:r>
+              <a:rPr lang="en-US" sz="1400" dirty="0">
+                <a:solidFill>
+                  <a:schemeClr val="accent2"/>
+                </a:solidFill>
+              </a:rPr>
+              <a:t>AcetylH3K9: 7</a:t>
+            </a:r>
+            <a:endParaRPr lang="de-DE" sz="1400" dirty="0" err="1">
+              <a:solidFill>
+                <a:schemeClr val="accent2"/>
+              </a:solidFill>
+            </a:endParaRPr>
+          </a:p>
+        </p:txBody>
+      </p:sp>
+      <p:cxnSp>
+        <p:nvCxnSpPr>
+          <p:cNvPr id="20" name="Gerader Verbinder 19">
+            <a:extLst>
+              <a:ext uri="{FF2B5EF4-FFF2-40B4-BE49-F238E27FC236}">
+                <a16:creationId xmlns:a16="http://schemas.microsoft.com/office/drawing/2014/main" id="{6D3C79F8-9874-4C59-B56B-3EA512CA80D6}"/>
+              </a:ext>
+            </a:extLst>
+          </p:cNvPr>
+          <p:cNvCxnSpPr>
+            <a:cxnSpLocks/>
+            <a:stCxn id="6" idx="1"/>
+            <a:endCxn id="7" idx="0"/>
+          </p:cNvCxnSpPr>
+          <p:nvPr/>
+        </p:nvCxnSpPr>
+        <p:spPr>
+          <a:xfrm flipH="1">
+            <a:off x="2606775" y="1757928"/>
+            <a:ext cx="1315937" cy="194911"/>
+          </a:xfrm>
+          <a:prstGeom prst="line">
+            <a:avLst/>
+          </a:prstGeom>
+          <a:ln w="12700">
+            <a:solidFill>
+              <a:schemeClr val="accent2"/>
+            </a:solidFill>
+            <a:tailEnd type="none" w="lg" len="med"/>
+          </a:ln>
+        </p:spPr>
+        <p:style>
+          <a:lnRef idx="1">
+            <a:schemeClr val="accent1"/>
+          </a:lnRef>
+          <a:fillRef idx="0">
+            <a:schemeClr val="accent1"/>
+          </a:fillRef>
+          <a:effectRef idx="0">
+            <a:schemeClr val="accent1"/>
+          </a:effectRef>
+          <a:fontRef idx="minor">
+            <a:schemeClr val="tx1"/>
+          </a:fontRef>
+        </p:style>
+      </p:cxnSp>
+      <p:cxnSp>
+        <p:nvCxnSpPr>
+          <p:cNvPr id="22" name="Gerader Verbinder 21">
+            <a:extLst>
+              <a:ext uri="{FF2B5EF4-FFF2-40B4-BE49-F238E27FC236}">
+                <a16:creationId xmlns:a16="http://schemas.microsoft.com/office/drawing/2014/main" id="{4FA0435F-F6EF-4CD2-8C63-0B3805844E47}"/>
+              </a:ext>
+            </a:extLst>
+          </p:cNvPr>
+          <p:cNvCxnSpPr>
+            <a:stCxn id="6" idx="3"/>
+            <a:endCxn id="8" idx="0"/>
+          </p:cNvCxnSpPr>
+          <p:nvPr/>
+        </p:nvCxnSpPr>
+        <p:spPr>
+          <a:xfrm>
+            <a:off x="4757877" y="1757928"/>
+            <a:ext cx="1506080" cy="194911"/>
+          </a:xfrm>
+          <a:prstGeom prst="line">
+            <a:avLst/>
+          </a:prstGeom>
+          <a:ln w="12700">
+            <a:solidFill>
+              <a:schemeClr val="accent2"/>
+            </a:solidFill>
+            <a:tailEnd type="none" w="lg" len="med"/>
+          </a:ln>
+        </p:spPr>
+        <p:style>
+          <a:lnRef idx="1">
+            <a:schemeClr val="accent1"/>
+          </a:lnRef>
+          <a:fillRef idx="0">
+            <a:schemeClr val="accent1"/>
+          </a:fillRef>
+          <a:effectRef idx="0">
+            <a:schemeClr val="accent1"/>
+          </a:effectRef>
+          <a:fontRef idx="minor">
+            <a:schemeClr val="tx1"/>
+          </a:fontRef>
+        </p:style>
+      </p:cxnSp>
+      <p:cxnSp>
+        <p:nvCxnSpPr>
+          <p:cNvPr id="25" name="Gerader Verbinder 24">
+            <a:extLst>
+              <a:ext uri="{FF2B5EF4-FFF2-40B4-BE49-F238E27FC236}">
+                <a16:creationId xmlns:a16="http://schemas.microsoft.com/office/drawing/2014/main" id="{C6701025-9CB5-4A1A-81C1-18F4EFCFE1EA}"/>
+              </a:ext>
+            </a:extLst>
+          </p:cNvPr>
+          <p:cNvCxnSpPr>
+            <a:stCxn id="7" idx="1"/>
+            <a:endCxn id="9" idx="0"/>
+          </p:cNvCxnSpPr>
+          <p:nvPr/>
+        </p:nvCxnSpPr>
+        <p:spPr>
+          <a:xfrm flipH="1">
+            <a:off x="1840539" y="2060561"/>
+            <a:ext cx="452848" cy="461404"/>
+          </a:xfrm>
+          <a:prstGeom prst="line">
+            <a:avLst/>
+          </a:prstGeom>
+          <a:ln w="12700">
+            <a:solidFill>
+              <a:schemeClr val="accent2"/>
+            </a:solidFill>
+            <a:tailEnd type="none" w="lg" len="med"/>
+          </a:ln>
+        </p:spPr>
+        <p:style>
+          <a:lnRef idx="1">
+            <a:schemeClr val="accent1"/>
+          </a:lnRef>
+          <a:fillRef idx="0">
+            <a:schemeClr val="accent1"/>
+          </a:fillRef>
+          <a:effectRef idx="0">
+            <a:schemeClr val="accent1"/>
+          </a:effectRef>
+          <a:fontRef idx="minor">
+            <a:schemeClr val="tx1"/>
+          </a:fontRef>
+        </p:style>
+      </p:cxnSp>
+      <p:cxnSp>
+        <p:nvCxnSpPr>
+          <p:cNvPr id="29" name="Gerader Verbinder 28">
+            <a:extLst>
+              <a:ext uri="{FF2B5EF4-FFF2-40B4-BE49-F238E27FC236}">
+                <a16:creationId xmlns:a16="http://schemas.microsoft.com/office/drawing/2014/main" id="{7A2CBCAA-3B8A-4B66-BB42-0E97D1468207}"/>
+              </a:ext>
+            </a:extLst>
+          </p:cNvPr>
+          <p:cNvCxnSpPr>
+            <a:stCxn id="7" idx="3"/>
+            <a:endCxn id="10" idx="0"/>
+          </p:cNvCxnSpPr>
+          <p:nvPr/>
+        </p:nvCxnSpPr>
+        <p:spPr>
+          <a:xfrm>
+            <a:off x="2920162" y="2060561"/>
+            <a:ext cx="410453" cy="417549"/>
+          </a:xfrm>
+          <a:prstGeom prst="line">
+            <a:avLst/>
+          </a:prstGeom>
+          <a:ln w="12700">
+            <a:solidFill>
+              <a:schemeClr val="accent2"/>
+            </a:solidFill>
+            <a:tailEnd type="none" w="lg" len="med"/>
+          </a:ln>
+        </p:spPr>
+        <p:style>
+          <a:lnRef idx="1">
+            <a:schemeClr val="accent1"/>
+          </a:lnRef>
+          <a:fillRef idx="0">
+            <a:schemeClr val="accent1"/>
+          </a:fillRef>
+          <a:effectRef idx="0">
+            <a:schemeClr val="accent1"/>
+          </a:effectRef>
+          <a:fontRef idx="minor">
+            <a:schemeClr val="tx1"/>
+          </a:fontRef>
+        </p:style>
+      </p:cxnSp>
+      <p:cxnSp>
+        <p:nvCxnSpPr>
+          <p:cNvPr id="33" name="Gerader Verbinder 32">
+            <a:extLst>
+              <a:ext uri="{FF2B5EF4-FFF2-40B4-BE49-F238E27FC236}">
+                <a16:creationId xmlns:a16="http://schemas.microsoft.com/office/drawing/2014/main" id="{EFA5BBF8-830A-428F-B99F-AB4886433956}"/>
+              </a:ext>
+            </a:extLst>
+          </p:cNvPr>
+          <p:cNvCxnSpPr>
+            <a:cxnSpLocks/>
+            <a:stCxn id="9" idx="1"/>
+            <a:endCxn id="13" idx="0"/>
+          </p:cNvCxnSpPr>
+          <p:nvPr/>
+        </p:nvCxnSpPr>
+        <p:spPr>
+          <a:xfrm flipH="1">
+            <a:off x="1077378" y="2629687"/>
+            <a:ext cx="310312" cy="402034"/>
+          </a:xfrm>
+          <a:prstGeom prst="line">
+            <a:avLst/>
+          </a:prstGeom>
+          <a:ln w="12700">
+            <a:solidFill>
+              <a:schemeClr val="accent2"/>
+            </a:solidFill>
+            <a:tailEnd type="none" w="lg" len="med"/>
+          </a:ln>
+        </p:spPr>
+        <p:style>
+          <a:lnRef idx="1">
+            <a:schemeClr val="accent1"/>
+          </a:lnRef>
+          <a:fillRef idx="0">
+            <a:schemeClr val="accent1"/>
+          </a:fillRef>
+          <a:effectRef idx="0">
+            <a:schemeClr val="accent1"/>
+          </a:effectRef>
+          <a:fontRef idx="minor">
+            <a:schemeClr val="tx1"/>
+          </a:fontRef>
+        </p:style>
+      </p:cxnSp>
+      <p:cxnSp>
+        <p:nvCxnSpPr>
+          <p:cNvPr id="35" name="Gerader Verbinder 34">
+            <a:extLst>
+              <a:ext uri="{FF2B5EF4-FFF2-40B4-BE49-F238E27FC236}">
+                <a16:creationId xmlns:a16="http://schemas.microsoft.com/office/drawing/2014/main" id="{2EDA86A8-CB64-46F7-A7C5-A008A3FFCD97}"/>
+              </a:ext>
+            </a:extLst>
+          </p:cNvPr>
+          <p:cNvCxnSpPr>
+            <a:stCxn id="10" idx="1"/>
+            <a:endCxn id="14" idx="0"/>
+          </p:cNvCxnSpPr>
+          <p:nvPr/>
+        </p:nvCxnSpPr>
+        <p:spPr>
+          <a:xfrm flipH="1">
+            <a:off x="2657334" y="2585832"/>
+            <a:ext cx="256724" cy="476911"/>
+          </a:xfrm>
+          <a:prstGeom prst="line">
+            <a:avLst/>
+          </a:prstGeom>
+          <a:ln w="12700">
+            <a:solidFill>
+              <a:schemeClr val="accent2"/>
+            </a:solidFill>
+            <a:tailEnd type="none" w="lg" len="med"/>
+          </a:ln>
+        </p:spPr>
+        <p:style>
+          <a:lnRef idx="1">
+            <a:schemeClr val="accent1"/>
+          </a:lnRef>
+          <a:fillRef idx="0">
+            <a:schemeClr val="accent1"/>
+          </a:fillRef>
+          <a:effectRef idx="0">
+            <a:schemeClr val="accent1"/>
+          </a:effectRef>
+          <a:fontRef idx="minor">
+            <a:schemeClr val="tx1"/>
+          </a:fontRef>
+        </p:style>
+      </p:cxnSp>
+      <p:cxnSp>
+        <p:nvCxnSpPr>
+          <p:cNvPr id="37" name="Gerader Verbinder 36">
+            <a:extLst>
+              <a:ext uri="{FF2B5EF4-FFF2-40B4-BE49-F238E27FC236}">
+                <a16:creationId xmlns:a16="http://schemas.microsoft.com/office/drawing/2014/main" id="{7793903D-3B37-433A-AF0E-386B7B9C3760}"/>
+              </a:ext>
+            </a:extLst>
+          </p:cNvPr>
+          <p:cNvCxnSpPr>
+            <a:stCxn id="10" idx="3"/>
+            <a:endCxn id="15" idx="0"/>
+          </p:cNvCxnSpPr>
+          <p:nvPr/>
+        </p:nvCxnSpPr>
+        <p:spPr>
+          <a:xfrm>
+            <a:off x="3747171" y="2585832"/>
+            <a:ext cx="243440" cy="449885"/>
+          </a:xfrm>
+          <a:prstGeom prst="line">
+            <a:avLst/>
+          </a:prstGeom>
+          <a:ln w="12700">
+            <a:solidFill>
+              <a:schemeClr val="accent2"/>
+            </a:solidFill>
+            <a:tailEnd type="none" w="lg" len="med"/>
+          </a:ln>
+        </p:spPr>
+        <p:style>
+          <a:lnRef idx="1">
+            <a:schemeClr val="accent1"/>
+          </a:lnRef>
+          <a:fillRef idx="0">
+            <a:schemeClr val="accent1"/>
+          </a:fillRef>
+          <a:effectRef idx="0">
+            <a:schemeClr val="accent1"/>
+          </a:effectRef>
+          <a:fontRef idx="minor">
+            <a:schemeClr val="tx1"/>
+          </a:fontRef>
+        </p:style>
+      </p:cxnSp>
+      <p:cxnSp>
+        <p:nvCxnSpPr>
+          <p:cNvPr id="39" name="Gerader Verbinder 38">
+            <a:extLst>
+              <a:ext uri="{FF2B5EF4-FFF2-40B4-BE49-F238E27FC236}">
+                <a16:creationId xmlns:a16="http://schemas.microsoft.com/office/drawing/2014/main" id="{29CD1CBD-6D8B-490E-BE4A-6375D2C30689}"/>
+              </a:ext>
+            </a:extLst>
+          </p:cNvPr>
+          <p:cNvCxnSpPr>
+            <a:stCxn id="11" idx="3"/>
+            <a:endCxn id="16" idx="0"/>
+          </p:cNvCxnSpPr>
+          <p:nvPr/>
+        </p:nvCxnSpPr>
+        <p:spPr>
+          <a:xfrm>
+            <a:off x="5810441" y="2585832"/>
+            <a:ext cx="187706" cy="446122"/>
+          </a:xfrm>
+          <a:prstGeom prst="line">
+            <a:avLst/>
+          </a:prstGeom>
+          <a:ln w="12700">
+            <a:solidFill>
+              <a:schemeClr val="accent2"/>
+            </a:solidFill>
+            <a:tailEnd type="none" w="lg" len="med"/>
+          </a:ln>
+        </p:spPr>
+        <p:style>
+          <a:lnRef idx="1">
+            <a:schemeClr val="accent1"/>
+          </a:lnRef>
+          <a:fillRef idx="0">
+            <a:schemeClr val="accent1"/>
+          </a:fillRef>
+          <a:effectRef idx="0">
+            <a:schemeClr val="accent1"/>
+          </a:effectRef>
+          <a:fontRef idx="minor">
+            <a:schemeClr val="tx1"/>
+          </a:fontRef>
+        </p:style>
+      </p:cxnSp>
+      <p:cxnSp>
+        <p:nvCxnSpPr>
+          <p:cNvPr id="41" name="Gerader Verbinder 40">
+            <a:extLst>
+              <a:ext uri="{FF2B5EF4-FFF2-40B4-BE49-F238E27FC236}">
+                <a16:creationId xmlns:a16="http://schemas.microsoft.com/office/drawing/2014/main" id="{99B9B712-5E17-4875-931E-B099D8981183}"/>
+              </a:ext>
+            </a:extLst>
+          </p:cNvPr>
+          <p:cNvCxnSpPr>
+            <a:stCxn id="8" idx="1"/>
+            <a:endCxn id="11" idx="0"/>
+          </p:cNvCxnSpPr>
+          <p:nvPr/>
+        </p:nvCxnSpPr>
+        <p:spPr>
+          <a:xfrm flipH="1">
+            <a:off x="5332458" y="2060561"/>
+            <a:ext cx="476246" cy="417549"/>
+          </a:xfrm>
+          <a:prstGeom prst="line">
+            <a:avLst/>
+          </a:prstGeom>
+          <a:ln w="12700">
+            <a:solidFill>
+              <a:schemeClr val="accent2"/>
+            </a:solidFill>
+            <a:tailEnd type="none" w="lg" len="med"/>
+          </a:ln>
+        </p:spPr>
+        <p:style>
+          <a:lnRef idx="1">
+            <a:schemeClr val="accent1"/>
+          </a:lnRef>
+          <a:fillRef idx="0">
+            <a:schemeClr val="accent1"/>
+          </a:fillRef>
+          <a:effectRef idx="0">
+            <a:schemeClr val="accent1"/>
+          </a:effectRef>
+          <a:fontRef idx="minor">
+            <a:schemeClr val="tx1"/>
+          </a:fontRef>
+        </p:style>
+      </p:cxnSp>
+      <p:cxnSp>
+        <p:nvCxnSpPr>
+          <p:cNvPr id="43" name="Gerader Verbinder 42">
+            <a:extLst>
+              <a:ext uri="{FF2B5EF4-FFF2-40B4-BE49-F238E27FC236}">
+                <a16:creationId xmlns:a16="http://schemas.microsoft.com/office/drawing/2014/main" id="{228FFAD6-B43B-49B0-A0C7-992DB8512182}"/>
+              </a:ext>
+            </a:extLst>
+          </p:cNvPr>
+          <p:cNvCxnSpPr>
+            <a:stCxn id="8" idx="3"/>
+            <a:endCxn id="12" idx="0"/>
+          </p:cNvCxnSpPr>
+          <p:nvPr/>
+        </p:nvCxnSpPr>
+        <p:spPr>
+          <a:xfrm>
+            <a:off x="6719210" y="2060561"/>
+            <a:ext cx="1042700" cy="353682"/>
+          </a:xfrm>
+          <a:prstGeom prst="line">
+            <a:avLst/>
+          </a:prstGeom>
+          <a:ln w="12700">
+            <a:solidFill>
+              <a:schemeClr val="accent2"/>
+            </a:solidFill>
+            <a:tailEnd type="none" w="lg" len="med"/>
+          </a:ln>
+        </p:spPr>
+        <p:style>
+          <a:lnRef idx="1">
+            <a:schemeClr val="accent1"/>
+          </a:lnRef>
+          <a:fillRef idx="0">
+            <a:schemeClr val="accent1"/>
+          </a:fillRef>
+          <a:effectRef idx="0">
+            <a:schemeClr val="accent1"/>
+          </a:effectRef>
+          <a:fontRef idx="minor">
+            <a:schemeClr val="tx1"/>
+          </a:fontRef>
+        </p:style>
+      </p:cxnSp>
+      <p:cxnSp>
+        <p:nvCxnSpPr>
+          <p:cNvPr id="45" name="Gerader Verbinder 44">
+            <a:extLst>
+              <a:ext uri="{FF2B5EF4-FFF2-40B4-BE49-F238E27FC236}">
+                <a16:creationId xmlns:a16="http://schemas.microsoft.com/office/drawing/2014/main" id="{9E8898A8-836C-48C9-8F4F-2FC26DC7AB6A}"/>
+              </a:ext>
+            </a:extLst>
+          </p:cNvPr>
+          <p:cNvCxnSpPr>
+            <a:stCxn id="12" idx="3"/>
+            <a:endCxn id="18" idx="0"/>
+          </p:cNvCxnSpPr>
+          <p:nvPr/>
+        </p:nvCxnSpPr>
+        <p:spPr>
+          <a:xfrm>
+            <a:off x="8189912" y="2521965"/>
+            <a:ext cx="175725" cy="509756"/>
+          </a:xfrm>
+          <a:prstGeom prst="line">
+            <a:avLst/>
+          </a:prstGeom>
+          <a:ln w="12700">
+            <a:solidFill>
+              <a:schemeClr val="accent2"/>
+            </a:solidFill>
+            <a:tailEnd type="none" w="lg" len="med"/>
+          </a:ln>
+        </p:spPr>
+        <p:style>
+          <a:lnRef idx="1">
+            <a:schemeClr val="accent1"/>
+          </a:lnRef>
+          <a:fillRef idx="0">
+            <a:schemeClr val="accent1"/>
+          </a:fillRef>
+          <a:effectRef idx="0">
+            <a:schemeClr val="accent1"/>
+          </a:effectRef>
+          <a:fontRef idx="minor">
+            <a:schemeClr val="tx1"/>
+          </a:fontRef>
+        </p:style>
+      </p:cxnSp>
+      <p:cxnSp>
+        <p:nvCxnSpPr>
+          <p:cNvPr id="47" name="Gerader Verbinder 46">
+            <a:extLst>
+              <a:ext uri="{FF2B5EF4-FFF2-40B4-BE49-F238E27FC236}">
+                <a16:creationId xmlns:a16="http://schemas.microsoft.com/office/drawing/2014/main" id="{3742C287-0A61-45AB-BF62-8DA3D65DD920}"/>
+              </a:ext>
+            </a:extLst>
+          </p:cNvPr>
+          <p:cNvCxnSpPr>
+            <a:stCxn id="12" idx="1"/>
+            <a:endCxn id="17" idx="0"/>
+          </p:cNvCxnSpPr>
+          <p:nvPr/>
+        </p:nvCxnSpPr>
+        <p:spPr>
+          <a:xfrm flipH="1">
+            <a:off x="7215629" y="2521965"/>
+            <a:ext cx="118279" cy="509756"/>
+          </a:xfrm>
+          <a:prstGeom prst="line">
+            <a:avLst/>
+          </a:prstGeom>
+          <a:ln w="12700">
+            <a:solidFill>
+              <a:schemeClr val="accent2"/>
+            </a:solidFill>
+            <a:tailEnd type="none" w="lg" len="med"/>
+          </a:ln>
+        </p:spPr>
+        <p:style>
+          <a:lnRef idx="1">
+            <a:schemeClr val="accent1"/>
+          </a:lnRef>
+          <a:fillRef idx="0">
+            <a:schemeClr val="accent1"/>
+          </a:fillRef>
+          <a:effectRef idx="0">
+            <a:schemeClr val="accent1"/>
+          </a:effectRef>
+          <a:fontRef idx="minor">
+            <a:schemeClr val="tx1"/>
+          </a:fontRef>
+        </p:style>
+      </p:cxnSp>
+    </p:spTree>
+    <p:extLst>
+      <p:ext uri="{BB962C8B-B14F-4D97-AF65-F5344CB8AC3E}">
+        <p14:creationId xmlns:p14="http://schemas.microsoft.com/office/powerpoint/2010/main" val="3928513839"/>
+      </p:ext>
+    </p:extLst>
+  </p:cSld>
+  <p:clrMapOvr>
+    <a:masterClrMapping/>
+  </p:clrMapOvr>
+</p:sld>
+</file>
+
+<file path=ppt/slides/slide5.xml><?xml version="1.0" encoding="utf-8"?>
+<p:sld xmlns:a="http://schemas.openxmlformats.org/drawingml/2006/main" xmlns:r="http://schemas.openxmlformats.org/officeDocument/2006/relationships" xmlns:p="http://schemas.openxmlformats.org/presentationml/2006/main">
+  <p:cSld>
+    <p:spTree>
+      <p:nvGrpSpPr>
+        <p:cNvPr id="1" name=""/>
+        <p:cNvGrpSpPr/>
+        <p:nvPr/>
+      </p:nvGrpSpPr>
+      <p:grpSpPr>
+        <a:xfrm>
+          <a:off x="0" y="0"/>
+          <a:ext cx="0" cy="0"/>
+          <a:chOff x="0" y="0"/>
+          <a:chExt cx="0" cy="0"/>
+        </a:xfrm>
+      </p:grpSpPr>
+      <p:sp>
+        <p:nvSpPr>
           <p:cNvPr id="4" name="Titel 3"/>
           <p:cNvSpPr>
             <a:spLocks noGrp="1"/>
@@ -19853,7 +22121,7 @@
     </p:spTree>
     <p:extLst>
       <p:ext uri="{BB962C8B-B14F-4D97-AF65-F5344CB8AC3E}">
-        <p14:creationId xmlns:p14="http://schemas.microsoft.com/office/powerpoint/2010/main" val="3928513839"/>
+        <p14:creationId xmlns:p14="http://schemas.microsoft.com/office/powerpoint/2010/main" val="2971011411"/>
       </p:ext>
     </p:extLst>
   </p:cSld>
@@ -19863,7 +22131,441 @@
 </p:sld>
 </file>
 
-<file path=ppt/slides/slide4.xml><?xml version="1.0" encoding="utf-8"?>
+<file path=ppt/slides/slide6.xml><?xml version="1.0" encoding="utf-8"?>
+<p:sld xmlns:a="http://schemas.openxmlformats.org/drawingml/2006/main" xmlns:r="http://schemas.openxmlformats.org/officeDocument/2006/relationships" xmlns:p="http://schemas.openxmlformats.org/presentationml/2006/main">
+  <p:cSld>
+    <p:spTree>
+      <p:nvGrpSpPr>
+        <p:cNvPr id="1" name=""/>
+        <p:cNvGrpSpPr/>
+        <p:nvPr/>
+      </p:nvGrpSpPr>
+      <p:grpSpPr>
+        <a:xfrm>
+          <a:off x="0" y="0"/>
+          <a:ext cx="0" cy="0"/>
+          <a:chOff x="0" y="0"/>
+          <a:chExt cx="0" cy="0"/>
+        </a:xfrm>
+      </p:grpSpPr>
+      <p:sp>
+        <p:nvSpPr>
+          <p:cNvPr id="4" name="Titel 3"/>
+          <p:cNvSpPr>
+            <a:spLocks noGrp="1"/>
+          </p:cNvSpPr>
+          <p:nvPr>
+            <p:ph type="title"/>
+          </p:nvPr>
+        </p:nvSpPr>
+        <p:spPr/>
+        <p:txBody>
+          <a:bodyPr/>
+          <a:lstStyle/>
+          <a:p>
+            <a:r>
+              <a:rPr lang="en-US" dirty="0"/>
+              <a:t>Group dependent Task</a:t>
+            </a:r>
+            <a:endParaRPr lang="de-DE" dirty="0"/>
+          </a:p>
+        </p:txBody>
+      </p:sp>
+      <p:pic>
+        <p:nvPicPr>
+          <p:cNvPr id="7" name="Inhaltsplatzhalter 6">
+            <a:extLst>
+              <a:ext uri="{FF2B5EF4-FFF2-40B4-BE49-F238E27FC236}">
+                <a16:creationId xmlns:a16="http://schemas.microsoft.com/office/drawing/2014/main" id="{E9ED8841-56E3-4CEA-8385-03F9EEAE2CE0}"/>
+              </a:ext>
+            </a:extLst>
+          </p:cNvPr>
+          <p:cNvPicPr>
+            <a:picLocks noGrp="1" noChangeAspect="1"/>
+          </p:cNvPicPr>
+          <p:nvPr>
+            <p:ph idx="1"/>
+          </p:nvPr>
+        </p:nvPicPr>
+        <p:blipFill>
+          <a:blip r:embed="rId3">
+            <a:extLst>
+              <a:ext uri="{28A0092B-C50C-407E-A947-70E740481C1C}">
+                <a14:useLocalDpi xmlns:a14="http://schemas.microsoft.com/office/drawing/2010/main" val="0"/>
+              </a:ext>
+            </a:extLst>
+          </a:blip>
+          <a:stretch>
+            <a:fillRect/>
+          </a:stretch>
+        </p:blipFill>
+        <p:spPr>
+          <a:xfrm>
+            <a:off x="288130" y="1068387"/>
+            <a:ext cx="8640763" cy="2826460"/>
+          </a:xfrm>
+        </p:spPr>
+      </p:pic>
+      <p:sp>
+        <p:nvSpPr>
+          <p:cNvPr id="8" name="Textfeld 7">
+            <a:extLst>
+              <a:ext uri="{FF2B5EF4-FFF2-40B4-BE49-F238E27FC236}">
+                <a16:creationId xmlns:a16="http://schemas.microsoft.com/office/drawing/2014/main" id="{FBC80FAD-EF10-4BB9-B9CA-7FF11AD417E4}"/>
+              </a:ext>
+            </a:extLst>
+          </p:cNvPr>
+          <p:cNvSpPr txBox="1"/>
+          <p:nvPr/>
+        </p:nvSpPr>
+        <p:spPr>
+          <a:xfrm>
+            <a:off x="1331912" y="4497387"/>
+            <a:ext cx="5482655" cy="215444"/>
+          </a:xfrm>
+          <a:prstGeom prst="rect">
+            <a:avLst/>
+          </a:prstGeom>
+          <a:noFill/>
+        </p:spPr>
+        <p:txBody>
+          <a:bodyPr wrap="none" lIns="0" tIns="0" rIns="0" bIns="0" rtlCol="0">
+            <a:spAutoFit/>
+          </a:bodyPr>
+          <a:lstStyle/>
+          <a:p>
+            <a:pPr marL="216000" indent="-216000">
+              <a:spcAft>
+                <a:spcPts val="420"/>
+              </a:spcAft>
+              <a:buFont typeface="Calibri" panose="020F0502020204030204" pitchFamily="34" charset="0"/>
+              <a:buChar char="−"/>
+            </a:pPr>
+            <a:r>
+              <a:rPr lang="en-US" sz="1400" dirty="0">
+                <a:solidFill>
+                  <a:schemeClr val="accent2"/>
+                </a:solidFill>
+              </a:rPr>
+              <a:t>Accuracy: 0.829 (Depth 3) 		Accuracy: 0.87 (Depth 7)</a:t>
+            </a:r>
+            <a:endParaRPr lang="de-DE" sz="1400" dirty="0" err="1">
+              <a:solidFill>
+                <a:schemeClr val="accent2"/>
+              </a:solidFill>
+            </a:endParaRPr>
+          </a:p>
+        </p:txBody>
+      </p:sp>
+      <p:sp>
+        <p:nvSpPr>
+          <p:cNvPr id="9" name="Textfeld 8">
+            <a:extLst>
+              <a:ext uri="{FF2B5EF4-FFF2-40B4-BE49-F238E27FC236}">
+                <a16:creationId xmlns:a16="http://schemas.microsoft.com/office/drawing/2014/main" id="{FCD1BD7E-4B94-4ED4-B5BA-1DDE54BF5FCC}"/>
+              </a:ext>
+            </a:extLst>
+          </p:cNvPr>
+          <p:cNvSpPr txBox="1"/>
+          <p:nvPr/>
+        </p:nvSpPr>
+        <p:spPr>
+          <a:xfrm>
+            <a:off x="1331912" y="4116387"/>
+            <a:ext cx="5007461" cy="215444"/>
+          </a:xfrm>
+          <a:prstGeom prst="rect">
+            <a:avLst/>
+          </a:prstGeom>
+          <a:noFill/>
+        </p:spPr>
+        <p:txBody>
+          <a:bodyPr wrap="none" lIns="0" tIns="0" rIns="0" bIns="0" rtlCol="0">
+            <a:spAutoFit/>
+          </a:bodyPr>
+          <a:lstStyle/>
+          <a:p>
+            <a:pPr marL="216000" indent="-216000">
+              <a:spcAft>
+                <a:spcPts val="420"/>
+              </a:spcAft>
+              <a:buFont typeface="Calibri" panose="020F0502020204030204" pitchFamily="34" charset="0"/>
+              <a:buChar char="−"/>
+            </a:pPr>
+            <a:r>
+              <a:rPr lang="de-DE" sz="1400" dirty="0">
+                <a:solidFill>
+                  <a:schemeClr val="accent2"/>
+                </a:solidFill>
+              </a:rPr>
+              <a:t>Labels </a:t>
+            </a:r>
+            <a:r>
+              <a:rPr lang="de-DE" sz="1400" dirty="0" err="1">
+                <a:solidFill>
+                  <a:schemeClr val="accent2"/>
+                </a:solidFill>
+              </a:rPr>
+              <a:t>Flipped</a:t>
+            </a:r>
+            <a:r>
+              <a:rPr lang="de-DE" sz="1400" dirty="0">
+                <a:solidFill>
+                  <a:schemeClr val="accent2"/>
+                </a:solidFill>
+              </a:rPr>
+              <a:t>: 61 / 701		</a:t>
+            </a:r>
+            <a:r>
+              <a:rPr lang="de-DE" sz="1400" dirty="0" err="1">
+                <a:solidFill>
+                  <a:schemeClr val="accent2"/>
+                </a:solidFill>
+              </a:rPr>
+              <a:t>Percentage</a:t>
+            </a:r>
+            <a:r>
+              <a:rPr lang="de-DE" sz="1400" dirty="0">
+                <a:solidFill>
+                  <a:schemeClr val="accent2"/>
+                </a:solidFill>
+              </a:rPr>
+              <a:t>: 0.087</a:t>
+            </a:r>
+          </a:p>
+        </p:txBody>
+      </p:sp>
+    </p:spTree>
+    <p:extLst>
+      <p:ext uri="{BB962C8B-B14F-4D97-AF65-F5344CB8AC3E}">
+        <p14:creationId xmlns:p14="http://schemas.microsoft.com/office/powerpoint/2010/main" val="3043722779"/>
+      </p:ext>
+    </p:extLst>
+  </p:cSld>
+  <p:clrMapOvr>
+    <a:masterClrMapping/>
+  </p:clrMapOvr>
+</p:sld>
+</file>
+
+<file path=ppt/slides/slide7.xml><?xml version="1.0" encoding="utf-8"?>
+<p:sld xmlns:a="http://schemas.openxmlformats.org/drawingml/2006/main" xmlns:r="http://schemas.openxmlformats.org/officeDocument/2006/relationships" xmlns:p="http://schemas.openxmlformats.org/presentationml/2006/main">
+  <p:cSld>
+    <p:spTree>
+      <p:nvGrpSpPr>
+        <p:cNvPr id="1" name=""/>
+        <p:cNvGrpSpPr/>
+        <p:nvPr/>
+      </p:nvGrpSpPr>
+      <p:grpSpPr>
+        <a:xfrm>
+          <a:off x="0" y="0"/>
+          <a:ext cx="0" cy="0"/>
+          <a:chOff x="0" y="0"/>
+          <a:chExt cx="0" cy="0"/>
+        </a:xfrm>
+      </p:grpSpPr>
+      <p:sp>
+        <p:nvSpPr>
+          <p:cNvPr id="4" name="Titel 3"/>
+          <p:cNvSpPr>
+            <a:spLocks noGrp="1"/>
+          </p:cNvSpPr>
+          <p:nvPr>
+            <p:ph type="title"/>
+          </p:nvPr>
+        </p:nvSpPr>
+        <p:spPr/>
+        <p:txBody>
+          <a:bodyPr/>
+          <a:lstStyle/>
+          <a:p>
+            <a:r>
+              <a:rPr lang="en-US" dirty="0"/>
+              <a:t>Group dependent Task</a:t>
+            </a:r>
+            <a:endParaRPr lang="de-DE" dirty="0"/>
+          </a:p>
+        </p:txBody>
+      </p:sp>
+      <p:sp>
+        <p:nvSpPr>
+          <p:cNvPr id="8" name="Textfeld 7">
+            <a:extLst>
+              <a:ext uri="{FF2B5EF4-FFF2-40B4-BE49-F238E27FC236}">
+                <a16:creationId xmlns:a16="http://schemas.microsoft.com/office/drawing/2014/main" id="{FBC80FAD-EF10-4BB9-B9CA-7FF11AD417E4}"/>
+              </a:ext>
+            </a:extLst>
+          </p:cNvPr>
+          <p:cNvSpPr txBox="1"/>
+          <p:nvPr/>
+        </p:nvSpPr>
+        <p:spPr>
+          <a:xfrm>
+            <a:off x="1331912" y="4497387"/>
+            <a:ext cx="5574026" cy="215444"/>
+          </a:xfrm>
+          <a:prstGeom prst="rect">
+            <a:avLst/>
+          </a:prstGeom>
+          <a:noFill/>
+        </p:spPr>
+        <p:txBody>
+          <a:bodyPr wrap="none" lIns="0" tIns="0" rIns="0" bIns="0" rtlCol="0">
+            <a:spAutoFit/>
+          </a:bodyPr>
+          <a:lstStyle/>
+          <a:p>
+            <a:pPr marL="216000" indent="-216000">
+              <a:spcAft>
+                <a:spcPts val="420"/>
+              </a:spcAft>
+              <a:buFont typeface="Calibri" panose="020F0502020204030204" pitchFamily="34" charset="0"/>
+              <a:buChar char="−"/>
+            </a:pPr>
+            <a:r>
+              <a:rPr lang="en-US" sz="1400" dirty="0">
+                <a:solidFill>
+                  <a:schemeClr val="accent2"/>
+                </a:solidFill>
+              </a:rPr>
+              <a:t>Accuracy: :0.795 (Depth 3) 		Accuracy: 0.777 (Depth 7)</a:t>
+            </a:r>
+            <a:endParaRPr lang="de-DE" sz="1400" dirty="0" err="1">
+              <a:solidFill>
+                <a:schemeClr val="accent2"/>
+              </a:solidFill>
+            </a:endParaRPr>
+          </a:p>
+        </p:txBody>
+      </p:sp>
+      <p:pic>
+        <p:nvPicPr>
+          <p:cNvPr id="6" name="Inhaltsplatzhalter 5">
+            <a:extLst>
+              <a:ext uri="{FF2B5EF4-FFF2-40B4-BE49-F238E27FC236}">
+                <a16:creationId xmlns:a16="http://schemas.microsoft.com/office/drawing/2014/main" id="{E501D074-C997-44AA-8C58-AB6A99F43D2A}"/>
+              </a:ext>
+            </a:extLst>
+          </p:cNvPr>
+          <p:cNvPicPr>
+            <a:picLocks noGrp="1" noChangeAspect="1"/>
+          </p:cNvPicPr>
+          <p:nvPr>
+            <p:ph idx="1"/>
+          </p:nvPr>
+        </p:nvPicPr>
+        <p:blipFill>
+          <a:blip r:embed="rId3">
+            <a:extLst>
+              <a:ext uri="{28A0092B-C50C-407E-A947-70E740481C1C}">
+                <a14:useLocalDpi xmlns:a14="http://schemas.microsoft.com/office/drawing/2010/main" val="0"/>
+              </a:ext>
+            </a:extLst>
+          </a:blip>
+          <a:stretch>
+            <a:fillRect/>
+          </a:stretch>
+        </p:blipFill>
+        <p:spPr>
+          <a:xfrm>
+            <a:off x="288925" y="1144587"/>
+            <a:ext cx="8640763" cy="2709354"/>
+          </a:xfrm>
+        </p:spPr>
+      </p:pic>
+      <p:sp>
+        <p:nvSpPr>
+          <p:cNvPr id="9" name="Textfeld 8">
+            <a:extLst>
+              <a:ext uri="{FF2B5EF4-FFF2-40B4-BE49-F238E27FC236}">
+                <a16:creationId xmlns:a16="http://schemas.microsoft.com/office/drawing/2014/main" id="{D3AF9F98-D8AD-4BB2-9CAC-7EF65BAC075E}"/>
+              </a:ext>
+            </a:extLst>
+          </p:cNvPr>
+          <p:cNvSpPr txBox="1"/>
+          <p:nvPr/>
+        </p:nvSpPr>
+        <p:spPr>
+          <a:xfrm>
+            <a:off x="1331912" y="4116387"/>
+            <a:ext cx="6195286" cy="215444"/>
+          </a:xfrm>
+          <a:prstGeom prst="rect">
+            <a:avLst/>
+          </a:prstGeom>
+          <a:noFill/>
+        </p:spPr>
+        <p:txBody>
+          <a:bodyPr wrap="none" lIns="0" tIns="0" rIns="0" bIns="0" rtlCol="0">
+            <a:spAutoFit/>
+          </a:bodyPr>
+          <a:lstStyle/>
+          <a:p>
+            <a:pPr marL="216000" indent="-216000">
+              <a:spcAft>
+                <a:spcPts val="420"/>
+              </a:spcAft>
+              <a:buFont typeface="Calibri" panose="020F0502020204030204" pitchFamily="34" charset="0"/>
+              <a:buChar char="−"/>
+            </a:pPr>
+            <a:r>
+              <a:rPr lang="de-DE" sz="1400" dirty="0">
+                <a:solidFill>
+                  <a:schemeClr val="accent2"/>
+                </a:solidFill>
+              </a:rPr>
+              <a:t>Labels </a:t>
+            </a:r>
+            <a:r>
+              <a:rPr lang="de-DE" sz="1400" dirty="0" err="1">
+                <a:solidFill>
+                  <a:schemeClr val="accent2"/>
+                </a:solidFill>
+              </a:rPr>
+              <a:t>Flipped</a:t>
+            </a:r>
+            <a:r>
+              <a:rPr lang="de-DE" sz="1400" dirty="0">
+                <a:solidFill>
+                  <a:schemeClr val="accent2"/>
+                </a:solidFill>
+              </a:rPr>
+              <a:t>: 194 / 701		</a:t>
+            </a:r>
+            <a:r>
+              <a:rPr lang="de-DE" sz="1400" dirty="0" err="1">
+                <a:solidFill>
+                  <a:schemeClr val="accent2"/>
+                </a:solidFill>
+              </a:rPr>
+              <a:t>Percentage</a:t>
+            </a:r>
+            <a:r>
+              <a:rPr lang="de-DE" sz="1400" dirty="0">
+                <a:solidFill>
+                  <a:schemeClr val="accent2"/>
+                </a:solidFill>
+              </a:rPr>
+              <a:t>: 0.2767475035663338</a:t>
+            </a:r>
+          </a:p>
+        </p:txBody>
+      </p:sp>
+    </p:spTree>
+    <p:extLst>
+      <p:ext uri="{BB962C8B-B14F-4D97-AF65-F5344CB8AC3E}">
+        <p14:creationId xmlns:p14="http://schemas.microsoft.com/office/powerpoint/2010/main" val="3589522015"/>
+      </p:ext>
+    </p:extLst>
+  </p:cSld>
+  <p:clrMapOvr>
+    <a:masterClrMapping/>
+  </p:clrMapOvr>
+</p:sld>
+</file>
+
+<file path=ppt/slides/slide8.xml><?xml version="1.0" encoding="utf-8"?>
 <p:sld xmlns:a="http://schemas.openxmlformats.org/drawingml/2006/main" xmlns:r="http://schemas.openxmlformats.org/officeDocument/2006/relationships" xmlns:p="http://schemas.openxmlformats.org/presentationml/2006/main">
   <p:cSld>
     <p:spTree>
@@ -19895,7 +22597,11 @@
           <a:bodyPr/>
           <a:lstStyle/>
           <a:p>
-            <a:endParaRPr lang="de-DE"/>
+            <a:r>
+              <a:rPr lang="en-US" dirty="0"/>
+              <a:t>Thank you for your kind attention.</a:t>
+            </a:r>
+            <a:endParaRPr lang="de-DE" dirty="0"/>
           </a:p>
         </p:txBody>
       </p:sp>
@@ -19914,7 +22620,29 @@
           <a:bodyPr/>
           <a:lstStyle/>
           <a:p>
-            <a:endParaRPr lang="de-DE"/>
+            <a:r>
+              <a:rPr lang="en-US" dirty="0"/>
+              <a:t>Martin Schmitz</a:t>
+            </a:r>
+          </a:p>
+          <a:p>
+            <a:r>
+              <a:rPr lang="en-US" dirty="0"/>
+              <a:t>Paul Bryan Alexander Hinzen</a:t>
+            </a:r>
+          </a:p>
+          <a:p>
+            <a:r>
+              <a:rPr lang="en-US" dirty="0"/>
+              <a:t>_______________________</a:t>
+            </a:r>
+          </a:p>
+          <a:p>
+            <a:r>
+              <a:rPr lang="en-US" dirty="0"/>
+              <a:t>Group 20</a:t>
+            </a:r>
+            <a:endParaRPr lang="de-DE" dirty="0"/>
           </a:p>
         </p:txBody>
       </p:sp>

</xml_diff>

<commit_message>
Usability Changes: Only need to execute main script to get all Trees. TODO: Accuracy of Classification Rules BUGS: petr pruning seems to flip some labels. Accuarcy ranges from 10-20 % instead of a solid 80-90%
</commit_message>
<xml_diff>
--- a/ML_Ass_1_Python27/Präsentation.pptx
+++ b/ML_Ass_1_Python27/Präsentation.pptx
@@ -5,20 +5,19 @@
     <p:sldMasterId id="2147483648" r:id="rId1"/>
   </p:sldMasterIdLst>
   <p:notesMasterIdLst>
-    <p:notesMasterId r:id="rId10"/>
+    <p:notesMasterId r:id="rId9"/>
   </p:notesMasterIdLst>
   <p:handoutMasterIdLst>
-    <p:handoutMasterId r:id="rId11"/>
+    <p:handoutMasterId r:id="rId10"/>
   </p:handoutMasterIdLst>
   <p:sldIdLst>
     <p:sldId id="256" r:id="rId2"/>
     <p:sldId id="257" r:id="rId3"/>
     <p:sldId id="264" r:id="rId4"/>
-    <p:sldId id="259" r:id="rId5"/>
-    <p:sldId id="265" r:id="rId6"/>
-    <p:sldId id="261" r:id="rId7"/>
-    <p:sldId id="263" r:id="rId8"/>
-    <p:sldId id="260" r:id="rId9"/>
+    <p:sldId id="265" r:id="rId5"/>
+    <p:sldId id="261" r:id="rId6"/>
+    <p:sldId id="263" r:id="rId7"/>
+    <p:sldId id="260" r:id="rId8"/>
   </p:sldIdLst>
   <p:sldSz cx="9217025" cy="5184775"/>
   <p:notesSz cx="6858000" cy="9144000"/>
@@ -295,7 +294,7 @@
           <a:p>
             <a:fld id="{9726303E-CDC6-4E11-A9F4-E5CE5F23E089}" type="datetimeFigureOut">
               <a:rPr lang="de-DE" smtClean="0"/>
-              <a:t>10.11.2017</a:t>
+              <a:t>16.11.2017</a:t>
             </a:fld>
             <a:endParaRPr lang="de-DE"/>
           </a:p>
@@ -669,7 +668,7 @@
           <a:p>
             <a:fld id="{9726303E-CDC6-4E11-A9F4-E5CE5F23E089}" type="datetimeFigureOut">
               <a:rPr lang="de-DE" smtClean="0"/>
-              <a:t>10.11.2017</a:t>
+              <a:t>16.11.2017</a:t>
             </a:fld>
             <a:endParaRPr lang="de-DE"/>
           </a:p>
@@ -989,7 +988,7 @@
           <a:p>
             <a:fld id="{EA01E532-3BA7-4831-8011-F32CAED0250C}" type="datetime1">
               <a:rPr lang="de-DE" smtClean="0"/>
-              <a:t>10.11.2017</a:t>
+              <a:t>16.11.2017</a:t>
             </a:fld>
             <a:endParaRPr lang="de-DE"/>
           </a:p>
@@ -1147,7 +1146,7 @@
           <a:p>
             <a:fld id="{B604FC25-97C2-4A57-85E7-B300A73F5385}" type="datetime1">
               <a:rPr lang="de-DE" smtClean="0"/>
-              <a:t>10.11.2017</a:t>
+              <a:t>16.11.2017</a:t>
             </a:fld>
             <a:endParaRPr lang="de-DE"/>
           </a:p>
@@ -1261,6 +1260,18 @@
           <a:bodyPr/>
           <a:lstStyle/>
           <a:p>
+            <a:r>
+              <a:rPr lang="en-US" sz="4000" dirty="0"/>
+              <a:t>(With “flipping”, we mean that the label indicating trisomy, is replaced by the label indicating a healthy mouse, and </a:t>
+            </a:r>
+            <a:r>
+              <a:rPr lang="en-US" sz="4000" dirty="0" err="1"/>
+              <a:t>vica</a:t>
+            </a:r>
+            <a:r>
+              <a:rPr lang="en-US" sz="4000" dirty="0"/>
+              <a:t> versa.) This way, you generate a “noisy” version of the labels of the training data. </a:t>
+            </a:r>
             <a:endParaRPr lang="de-DE" sz="4000" dirty="0"/>
           </a:p>
         </p:txBody>
@@ -1305,7 +1316,7 @@
           <a:p>
             <a:fld id="{57D0303F-3DAF-4A6B-82D1-800CC55ACE37}" type="datetime1">
               <a:rPr lang="de-DE" smtClean="0"/>
-              <a:t>10.11.2017</a:t>
+              <a:t>16.11.2017</a:t>
             </a:fld>
             <a:endParaRPr lang="de-DE"/>
           </a:p>
@@ -1360,7 +1371,7 @@
     </p:spTree>
     <p:extLst>
       <p:ext uri="{BB962C8B-B14F-4D97-AF65-F5344CB8AC3E}">
-        <p14:creationId xmlns:p14="http://schemas.microsoft.com/office/powerpoint/2010/main" val="1465385159"/>
+        <p14:creationId xmlns:p14="http://schemas.microsoft.com/office/powerpoint/2010/main" val="2852213382"/>
       </p:ext>
     </p:extLst>
   </p:cSld>
@@ -1419,18 +1430,6 @@
           <a:bodyPr/>
           <a:lstStyle/>
           <a:p>
-            <a:r>
-              <a:rPr lang="en-US" sz="4000" dirty="0"/>
-              <a:t>(With “flipping”, we mean that the label indicating trisomy, is replaced by the label indicating a healthy mouse, and </a:t>
-            </a:r>
-            <a:r>
-              <a:rPr lang="en-US" sz="4000" dirty="0" err="1"/>
-              <a:t>vica</a:t>
-            </a:r>
-            <a:r>
-              <a:rPr lang="en-US" sz="4000" dirty="0"/>
-              <a:t> versa.) This way, you generate a “noisy” version of the labels of the training data. </a:t>
-            </a:r>
             <a:endParaRPr lang="de-DE" sz="4000" dirty="0"/>
           </a:p>
         </p:txBody>
@@ -1475,7 +1474,7 @@
           <a:p>
             <a:fld id="{57D0303F-3DAF-4A6B-82D1-800CC55ACE37}" type="datetime1">
               <a:rPr lang="de-DE" smtClean="0"/>
-              <a:t>10.11.2017</a:t>
+              <a:t>16.11.2017</a:t>
             </a:fld>
             <a:endParaRPr lang="de-DE"/>
           </a:p>
@@ -1530,7 +1529,7 @@
     </p:spTree>
     <p:extLst>
       <p:ext uri="{BB962C8B-B14F-4D97-AF65-F5344CB8AC3E}">
-        <p14:creationId xmlns:p14="http://schemas.microsoft.com/office/powerpoint/2010/main" val="2852213382"/>
+        <p14:creationId xmlns:p14="http://schemas.microsoft.com/office/powerpoint/2010/main" val="2826011721"/>
       </p:ext>
     </p:extLst>
   </p:cSld>
@@ -1633,7 +1632,7 @@
           <a:p>
             <a:fld id="{57D0303F-3DAF-4A6B-82D1-800CC55ACE37}" type="datetime1">
               <a:rPr lang="de-DE" smtClean="0"/>
-              <a:t>10.11.2017</a:t>
+              <a:t>16.11.2017</a:t>
             </a:fld>
             <a:endParaRPr lang="de-DE"/>
           </a:p>
@@ -1680,164 +1679,6 @@
             <a:fld id="{B40210A4-2901-42F9-8CA9-E251F67383C7}" type="slidenum">
               <a:rPr lang="de-DE" smtClean="0"/>
               <a:t>6</a:t>
-            </a:fld>
-            <a:endParaRPr lang="de-DE"/>
-          </a:p>
-        </p:txBody>
-      </p:sp>
-    </p:spTree>
-    <p:extLst>
-      <p:ext uri="{BB962C8B-B14F-4D97-AF65-F5344CB8AC3E}">
-        <p14:creationId xmlns:p14="http://schemas.microsoft.com/office/powerpoint/2010/main" val="2826011721"/>
-      </p:ext>
-    </p:extLst>
-  </p:cSld>
-  <p:clrMapOvr>
-    <a:masterClrMapping/>
-  </p:clrMapOvr>
-</p:notes>
-</file>
-
-<file path=ppt/notesSlides/notesSlide6.xml><?xml version="1.0" encoding="utf-8"?>
-<p:notes xmlns:a="http://schemas.openxmlformats.org/drawingml/2006/main" xmlns:r="http://schemas.openxmlformats.org/officeDocument/2006/relationships" xmlns:p="http://schemas.openxmlformats.org/presentationml/2006/main">
-  <p:cSld>
-    <p:spTree>
-      <p:nvGrpSpPr>
-        <p:cNvPr id="1" name=""/>
-        <p:cNvGrpSpPr/>
-        <p:nvPr/>
-      </p:nvGrpSpPr>
-      <p:grpSpPr>
-        <a:xfrm>
-          <a:off x="0" y="0"/>
-          <a:ext cx="0" cy="0"/>
-          <a:chOff x="0" y="0"/>
-          <a:chExt cx="0" cy="0"/>
-        </a:xfrm>
-      </p:grpSpPr>
-      <p:sp>
-        <p:nvSpPr>
-          <p:cNvPr id="2" name="Folienbildplatzhalter 1"/>
-          <p:cNvSpPr>
-            <a:spLocks noGrp="1" noRot="1" noChangeAspect="1"/>
-          </p:cNvSpPr>
-          <p:nvPr>
-            <p:ph type="sldImg"/>
-          </p:nvPr>
-        </p:nvSpPr>
-        <p:spPr>
-          <a:xfrm>
-            <a:off x="382588" y="1116013"/>
-            <a:ext cx="6092825" cy="3429000"/>
-          </a:xfrm>
-        </p:spPr>
-      </p:sp>
-      <p:sp>
-        <p:nvSpPr>
-          <p:cNvPr id="3" name="Notizenplatzhalter 2"/>
-          <p:cNvSpPr>
-            <a:spLocks noGrp="1"/>
-          </p:cNvSpPr>
-          <p:nvPr>
-            <p:ph type="body" idx="1"/>
-          </p:nvPr>
-        </p:nvSpPr>
-        <p:spPr/>
-        <p:txBody>
-          <a:bodyPr/>
-          <a:lstStyle/>
-          <a:p>
-            <a:endParaRPr lang="de-DE" sz="4000" dirty="0"/>
-          </a:p>
-        </p:txBody>
-      </p:sp>
-      <p:sp>
-        <p:nvSpPr>
-          <p:cNvPr id="4" name="Kopfzeilenplatzhalter 3"/>
-          <p:cNvSpPr>
-            <a:spLocks noGrp="1"/>
-          </p:cNvSpPr>
-          <p:nvPr>
-            <p:ph type="hdr" sz="quarter" idx="10"/>
-          </p:nvPr>
-        </p:nvSpPr>
-        <p:spPr/>
-        <p:txBody>
-          <a:bodyPr/>
-          <a:lstStyle/>
-          <a:p>
-            <a:r>
-              <a:rPr lang="de-DE"/>
-              <a:t>Präsentationstitel</a:t>
-            </a:r>
-            <a:endParaRPr lang="de-DE" dirty="0"/>
-          </a:p>
-        </p:txBody>
-      </p:sp>
-      <p:sp>
-        <p:nvSpPr>
-          <p:cNvPr id="5" name="Datumsplatzhalter 4"/>
-          <p:cNvSpPr>
-            <a:spLocks noGrp="1"/>
-          </p:cNvSpPr>
-          <p:nvPr>
-            <p:ph type="dt" sz="quarter" idx="11"/>
-          </p:nvPr>
-        </p:nvSpPr>
-        <p:spPr/>
-        <p:txBody>
-          <a:bodyPr/>
-          <a:lstStyle/>
-          <a:p>
-            <a:fld id="{57D0303F-3DAF-4A6B-82D1-800CC55ACE37}" type="datetime1">
-              <a:rPr lang="de-DE" smtClean="0"/>
-              <a:t>10.11.2017</a:t>
-            </a:fld>
-            <a:endParaRPr lang="de-DE"/>
-          </a:p>
-        </p:txBody>
-      </p:sp>
-      <p:sp>
-        <p:nvSpPr>
-          <p:cNvPr id="6" name="Fußzeilenplatzhalter 5"/>
-          <p:cNvSpPr>
-            <a:spLocks noGrp="1"/>
-          </p:cNvSpPr>
-          <p:nvPr>
-            <p:ph type="ftr" sz="quarter" idx="12"/>
-          </p:nvPr>
-        </p:nvSpPr>
-        <p:spPr/>
-        <p:txBody>
-          <a:bodyPr/>
-          <a:lstStyle/>
-          <a:p>
-            <a:r>
-              <a:rPr lang="de-DE"/>
-              <a:t>Autor/Veranstaltung</a:t>
-            </a:r>
-            <a:endParaRPr lang="de-DE" dirty="0"/>
-          </a:p>
-        </p:txBody>
-      </p:sp>
-      <p:sp>
-        <p:nvSpPr>
-          <p:cNvPr id="7" name="Foliennummernplatzhalter 6"/>
-          <p:cNvSpPr>
-            <a:spLocks noGrp="1"/>
-          </p:cNvSpPr>
-          <p:nvPr>
-            <p:ph type="sldNum" sz="quarter" idx="13"/>
-          </p:nvPr>
-        </p:nvSpPr>
-        <p:spPr/>
-        <p:txBody>
-          <a:bodyPr/>
-          <a:lstStyle/>
-          <a:p>
-            <a:fld id="{B40210A4-2901-42F9-8CA9-E251F67383C7}" type="slidenum">
-              <a:rPr lang="de-DE" smtClean="0"/>
-              <a:t>7</a:t>
             </a:fld>
             <a:endParaRPr lang="de-DE"/>
           </a:p>
@@ -5357,7 +5198,7 @@
           <a:p>
             <a:fld id="{C056026F-1588-4FB1-8845-F95DAFF0F3E9}" type="datetime1">
               <a:rPr lang="de-DE" smtClean="0"/>
-              <a:t>10.11.2017</a:t>
+              <a:t>16.11.2017</a:t>
             </a:fld>
             <a:endParaRPr lang="de-DE"/>
           </a:p>
@@ -5878,7 +5719,7 @@
           <a:p>
             <a:fld id="{85E37377-EED6-47C3-9B1D-CF36F0FCD8B4}" type="datetime1">
               <a:rPr lang="de-DE" smtClean="0"/>
-              <a:t>10.11.2017</a:t>
+              <a:t>16.11.2017</a:t>
             </a:fld>
             <a:endParaRPr lang="de-DE"/>
           </a:p>
@@ -6145,7 +5986,7 @@
           <a:p>
             <a:fld id="{6B01E8E8-8A29-4D85-A2C3-6995032989B7}" type="datetime1">
               <a:rPr lang="de-DE" smtClean="0"/>
-              <a:t>10.11.2017</a:t>
+              <a:t>16.11.2017</a:t>
             </a:fld>
             <a:endParaRPr lang="de-DE"/>
           </a:p>
@@ -6412,7 +6253,7 @@
           <a:p>
             <a:fld id="{3CA6A51E-5224-4001-A6A1-6147DB41844D}" type="datetime1">
               <a:rPr lang="de-DE" smtClean="0"/>
-              <a:t>10.11.2017</a:t>
+              <a:t>16.11.2017</a:t>
             </a:fld>
             <a:endParaRPr lang="de-DE"/>
           </a:p>
@@ -6679,7 +6520,7 @@
           <a:p>
             <a:fld id="{0C1259EA-2A08-45BF-9248-C0AD7AEF30D3}" type="datetime1">
               <a:rPr lang="de-DE" smtClean="0"/>
-              <a:t>10.11.2017</a:t>
+              <a:t>16.11.2017</a:t>
             </a:fld>
             <a:endParaRPr lang="de-DE"/>
           </a:p>
@@ -6841,7 +6682,7 @@
           <a:p>
             <a:fld id="{0A2F6472-5AB0-4742-9C4D-F8F2B67B83AE}" type="datetime1">
               <a:rPr lang="de-DE" smtClean="0"/>
-              <a:t>10.11.2017</a:t>
+              <a:t>16.11.2017</a:t>
             </a:fld>
             <a:endParaRPr lang="de-DE"/>
           </a:p>
@@ -6939,7 +6780,7 @@
           <a:p>
             <a:fld id="{548F520C-6F56-480F-8597-220998799912}" type="datetime1">
               <a:rPr lang="de-DE" smtClean="0"/>
-              <a:t>10.11.2017</a:t>
+              <a:t>16.11.2017</a:t>
             </a:fld>
             <a:endParaRPr lang="de-DE"/>
           </a:p>
@@ -10236,7 +10077,7 @@
           <a:p>
             <a:fld id="{30A2658B-9DCA-4C61-BE60-88DEF3D1D478}" type="datetime1">
               <a:rPr lang="de-DE" smtClean="0"/>
-              <a:t>10.11.2017</a:t>
+              <a:t>16.11.2017</a:t>
             </a:fld>
             <a:endParaRPr lang="de-DE"/>
           </a:p>
@@ -10420,7 +10261,7 @@
           <a:p>
             <a:fld id="{EE1C2234-98B7-49F4-85EF-8DAF56499769}" type="datetime1">
               <a:rPr lang="de-DE" smtClean="0"/>
-              <a:t>10.11.2017</a:t>
+              <a:t>16.11.2017</a:t>
             </a:fld>
             <a:endParaRPr lang="de-DE"/>
           </a:p>
@@ -10602,7 +10443,7 @@
           <a:p>
             <a:fld id="{B5406BC5-04D9-4099-9923-D3D721330691}" type="datetime1">
               <a:rPr lang="de-DE" smtClean="0"/>
-              <a:t>10.11.2017</a:t>
+              <a:t>16.11.2017</a:t>
             </a:fld>
             <a:endParaRPr lang="de-DE"/>
           </a:p>
@@ -10779,7 +10620,7 @@
           <a:p>
             <a:fld id="{288921BD-6B3C-47BC-83C4-1C45CD0812D9}" type="datetime1">
               <a:rPr lang="de-DE" smtClean="0"/>
-              <a:t>10.11.2017</a:t>
+              <a:t>16.11.2017</a:t>
             </a:fld>
             <a:endParaRPr lang="de-DE"/>
           </a:p>
@@ -11057,7 +10898,7 @@
           <a:p>
             <a:fld id="{30A2658B-9DCA-4C61-BE60-88DEF3D1D478}" type="datetime1">
               <a:rPr lang="de-DE" smtClean="0"/>
-              <a:t>10.11.2017</a:t>
+              <a:t>16.11.2017</a:t>
             </a:fld>
             <a:endParaRPr lang="de-DE"/>
           </a:p>
@@ -14367,7 +14208,7 @@
           <a:p>
             <a:fld id="{5F1F23B7-A4E0-4A45-AADF-CD5A63F6F289}" type="datetime1">
               <a:rPr lang="de-DE" smtClean="0"/>
-              <a:t>10.11.2017</a:t>
+              <a:t>16.11.2017</a:t>
             </a:fld>
             <a:endParaRPr lang="de-DE"/>
           </a:p>
@@ -14803,7 +14644,7 @@
           <a:p>
             <a:fld id="{170EA310-62CF-4C13-8E83-90FE2584EEDC}" type="datetime1">
               <a:rPr lang="de-DE" smtClean="0"/>
-              <a:t>10.11.2017</a:t>
+              <a:t>16.11.2017</a:t>
             </a:fld>
             <a:endParaRPr lang="de-DE"/>
           </a:p>
@@ -15015,7 +14856,7 @@
           <a:p>
             <a:fld id="{FB10439F-E434-4863-9F94-40224B9CDFEB}" type="datetime1">
               <a:rPr lang="de-DE" smtClean="0"/>
-              <a:t>10.11.2017</a:t>
+              <a:t>16.11.2017</a:t>
             </a:fld>
             <a:endParaRPr lang="de-DE"/>
           </a:p>
@@ -15239,7 +15080,7 @@
           <a:p>
             <a:fld id="{315826E6-14F6-4DCD-8A58-C4BA917EDB34}" type="datetime1">
               <a:rPr lang="de-DE" smtClean="0"/>
-              <a:t>10.11.2017</a:t>
+              <a:t>16.11.2017</a:t>
             </a:fld>
             <a:endParaRPr lang="de-DE"/>
           </a:p>
@@ -15464,7 +15305,7 @@
           <a:p>
             <a:fld id="{4073110B-FC60-4FAB-ACE1-146858AC5C12}" type="datetime1">
               <a:rPr lang="de-DE" smtClean="0"/>
-              <a:t>10.11.2017</a:t>
+              <a:t>16.11.2017</a:t>
             </a:fld>
             <a:endParaRPr lang="de-DE"/>
           </a:p>
@@ -15746,7 +15587,7 @@
           <a:p>
             <a:fld id="{34409F38-DEF5-4898-9CDF-BDB6157DFE11}" type="datetime1">
               <a:rPr lang="de-DE" smtClean="0"/>
-              <a:t>10.11.2017</a:t>
+              <a:t>16.11.2017</a:t>
             </a:fld>
             <a:endParaRPr lang="de-DE"/>
           </a:p>
@@ -15963,7 +15804,7 @@
           <a:p>
             <a:fld id="{30A2658B-9DCA-4C61-BE60-88DEF3D1D478}" type="datetime1">
               <a:rPr lang="de-DE" smtClean="0"/>
-              <a:t>10.11.2017</a:t>
+              <a:t>16.11.2017</a:t>
             </a:fld>
             <a:endParaRPr lang="de-DE"/>
           </a:p>
@@ -19656,7 +19497,7 @@
           <a:p>
             <a:fld id="{288921BD-6B3C-47BC-83C4-1C45CD0812D9}" type="datetime1">
               <a:rPr lang="de-DE" smtClean="0"/>
-              <a:t>10.11.2017</a:t>
+              <a:t>16.11.2017</a:t>
             </a:fld>
             <a:endParaRPr lang="de-DE"/>
           </a:p>
@@ -20571,7 +20412,7 @@
           <a:p>
             <a:r>
               <a:rPr lang="en-US" dirty="0"/>
-              <a:t>Used Technologies</a:t>
+              <a:t>Unpruned</a:t>
             </a:r>
             <a:endParaRPr lang="de-DE" dirty="0"/>
           </a:p>
@@ -20594,7 +20435,7 @@
           <a:p>
             <a:fld id="{288921BD-6B3C-47BC-83C4-1C45CD0812D9}" type="datetime1">
               <a:rPr lang="de-DE" smtClean="0"/>
-              <a:t>10.11.2017</a:t>
+              <a:t>16.11.2017</a:t>
             </a:fld>
             <a:endParaRPr lang="de-DE"/>
           </a:p>
@@ -20787,1254 +20628,6 @@
           <a:p>
             <a:r>
               <a:rPr lang="en-US" dirty="0"/>
-              <a:t>Google Scholar Search</a:t>
-            </a:r>
-            <a:endParaRPr lang="de-DE" dirty="0"/>
-          </a:p>
-        </p:txBody>
-      </p:sp>
-      <p:sp>
-        <p:nvSpPr>
-          <p:cNvPr id="6" name="Textfeld 5">
-            <a:extLst>
-              <a:ext uri="{FF2B5EF4-FFF2-40B4-BE49-F238E27FC236}">
-                <a16:creationId xmlns:a16="http://schemas.microsoft.com/office/drawing/2014/main" id="{654895FD-D8A2-4BB2-BCA0-5B31FDBE5764}"/>
-              </a:ext>
-            </a:extLst>
-          </p:cNvPr>
-          <p:cNvSpPr txBox="1"/>
-          <p:nvPr/>
-        </p:nvSpPr>
-        <p:spPr>
-          <a:xfrm>
-            <a:off x="3922712" y="1650206"/>
-            <a:ext cx="835165" cy="215444"/>
-          </a:xfrm>
-          <a:prstGeom prst="rect">
-            <a:avLst/>
-          </a:prstGeom>
-          <a:noFill/>
-        </p:spPr>
-        <p:txBody>
-          <a:bodyPr wrap="none" lIns="0" tIns="0" rIns="0" bIns="0" rtlCol="0">
-            <a:spAutoFit/>
-          </a:bodyPr>
-          <a:lstStyle/>
-          <a:p>
-            <a:pPr>
-              <a:spcAft>
-                <a:spcPts val="420"/>
-              </a:spcAft>
-            </a:pPr>
-            <a:r>
-              <a:rPr lang="en-US" sz="1400" dirty="0">
-                <a:solidFill>
-                  <a:schemeClr val="accent2"/>
-                </a:solidFill>
-              </a:rPr>
-              <a:t>APP: 23100</a:t>
-            </a:r>
-            <a:endParaRPr lang="de-DE" sz="1400" dirty="0" err="1">
-              <a:solidFill>
-                <a:schemeClr val="accent2"/>
-              </a:solidFill>
-            </a:endParaRPr>
-          </a:p>
-        </p:txBody>
-      </p:sp>
-      <p:sp>
-        <p:nvSpPr>
-          <p:cNvPr id="7" name="Textfeld 6">
-            <a:extLst>
-              <a:ext uri="{FF2B5EF4-FFF2-40B4-BE49-F238E27FC236}">
-                <a16:creationId xmlns:a16="http://schemas.microsoft.com/office/drawing/2014/main" id="{B7E84CBE-171C-4610-9562-FAE97594FF5A}"/>
-              </a:ext>
-            </a:extLst>
-          </p:cNvPr>
-          <p:cNvSpPr txBox="1"/>
-          <p:nvPr/>
-        </p:nvSpPr>
-        <p:spPr>
-          <a:xfrm>
-            <a:off x="2293387" y="1952839"/>
-            <a:ext cx="626775" cy="215444"/>
-          </a:xfrm>
-          <a:prstGeom prst="rect">
-            <a:avLst/>
-          </a:prstGeom>
-          <a:noFill/>
-        </p:spPr>
-        <p:txBody>
-          <a:bodyPr wrap="square" lIns="0" tIns="0" rIns="0" bIns="0" rtlCol="0">
-            <a:spAutoFit/>
-          </a:bodyPr>
-          <a:lstStyle/>
-          <a:p>
-            <a:pPr>
-              <a:spcAft>
-                <a:spcPts val="420"/>
-              </a:spcAft>
-            </a:pPr>
-            <a:r>
-              <a:rPr lang="en-US" sz="1400" dirty="0">
-                <a:solidFill>
-                  <a:schemeClr val="accent2"/>
-                </a:solidFill>
-              </a:rPr>
-              <a:t>S6: 3600</a:t>
-            </a:r>
-            <a:endParaRPr lang="de-DE" sz="1400" dirty="0" err="1">
-              <a:solidFill>
-                <a:schemeClr val="accent2"/>
-              </a:solidFill>
-            </a:endParaRPr>
-          </a:p>
-        </p:txBody>
-      </p:sp>
-      <p:sp>
-        <p:nvSpPr>
-          <p:cNvPr id="8" name="Textfeld 7">
-            <a:extLst>
-              <a:ext uri="{FF2B5EF4-FFF2-40B4-BE49-F238E27FC236}">
-                <a16:creationId xmlns:a16="http://schemas.microsoft.com/office/drawing/2014/main" id="{BE8B5660-C3EF-413A-AF5E-6F1E1A5ECDB6}"/>
-              </a:ext>
-            </a:extLst>
-          </p:cNvPr>
-          <p:cNvSpPr txBox="1"/>
-          <p:nvPr/>
-        </p:nvSpPr>
-        <p:spPr>
-          <a:xfrm>
-            <a:off x="5808704" y="1952839"/>
-            <a:ext cx="910506" cy="215444"/>
-          </a:xfrm>
-          <a:prstGeom prst="rect">
-            <a:avLst/>
-          </a:prstGeom>
-          <a:noFill/>
-        </p:spPr>
-        <p:txBody>
-          <a:bodyPr wrap="none" lIns="0" tIns="0" rIns="0" bIns="0" rtlCol="0">
-            <a:spAutoFit/>
-          </a:bodyPr>
-          <a:lstStyle/>
-          <a:p>
-            <a:pPr>
-              <a:spcAft>
-                <a:spcPts val="420"/>
-              </a:spcAft>
-            </a:pPr>
-            <a:r>
-              <a:rPr lang="en-US" sz="1400" dirty="0">
-                <a:solidFill>
-                  <a:schemeClr val="accent2"/>
-                </a:solidFill>
-              </a:rPr>
-              <a:t>AMPKA: 839</a:t>
-            </a:r>
-            <a:endParaRPr lang="de-DE" sz="1400" dirty="0" err="1">
-              <a:solidFill>
-                <a:schemeClr val="accent2"/>
-              </a:solidFill>
-            </a:endParaRPr>
-          </a:p>
-        </p:txBody>
-      </p:sp>
-      <p:sp>
-        <p:nvSpPr>
-          <p:cNvPr id="9" name="Textfeld 8">
-            <a:extLst>
-              <a:ext uri="{FF2B5EF4-FFF2-40B4-BE49-F238E27FC236}">
-                <a16:creationId xmlns:a16="http://schemas.microsoft.com/office/drawing/2014/main" id="{5E057A08-65F8-4EBC-A8A0-67B0D6C18D4A}"/>
-              </a:ext>
-            </a:extLst>
-          </p:cNvPr>
-          <p:cNvSpPr txBox="1"/>
-          <p:nvPr/>
-        </p:nvSpPr>
-        <p:spPr>
-          <a:xfrm>
-            <a:off x="1387690" y="2521965"/>
-            <a:ext cx="905697" cy="215444"/>
-          </a:xfrm>
-          <a:prstGeom prst="rect">
-            <a:avLst/>
-          </a:prstGeom>
-          <a:noFill/>
-        </p:spPr>
-        <p:txBody>
-          <a:bodyPr wrap="square" lIns="0" tIns="0" rIns="0" bIns="0" rtlCol="0">
-            <a:spAutoFit/>
-          </a:bodyPr>
-          <a:lstStyle/>
-          <a:p>
-            <a:pPr>
-              <a:spcAft>
-                <a:spcPts val="420"/>
-              </a:spcAft>
-            </a:pPr>
-            <a:r>
-              <a:rPr lang="en-US" sz="1400" dirty="0">
-                <a:solidFill>
-                  <a:schemeClr val="accent2"/>
-                </a:solidFill>
-              </a:rPr>
-              <a:t>pP70S6: 161</a:t>
-            </a:r>
-            <a:endParaRPr lang="de-DE" sz="1400" dirty="0" err="1">
-              <a:solidFill>
-                <a:schemeClr val="accent2"/>
-              </a:solidFill>
-            </a:endParaRPr>
-          </a:p>
-        </p:txBody>
-      </p:sp>
-      <p:sp>
-        <p:nvSpPr>
-          <p:cNvPr id="10" name="Textfeld 9">
-            <a:extLst>
-              <a:ext uri="{FF2B5EF4-FFF2-40B4-BE49-F238E27FC236}">
-                <a16:creationId xmlns:a16="http://schemas.microsoft.com/office/drawing/2014/main" id="{E345F6E2-8657-4D3E-BC3D-A4BEEAB80BD9}"/>
-              </a:ext>
-            </a:extLst>
-          </p:cNvPr>
-          <p:cNvSpPr txBox="1"/>
-          <p:nvPr/>
-        </p:nvSpPr>
-        <p:spPr>
-          <a:xfrm>
-            <a:off x="2914058" y="2478110"/>
-            <a:ext cx="833113" cy="215444"/>
-          </a:xfrm>
-          <a:prstGeom prst="rect">
-            <a:avLst/>
-          </a:prstGeom>
-          <a:noFill/>
-        </p:spPr>
-        <p:txBody>
-          <a:bodyPr wrap="square" lIns="0" tIns="0" rIns="0" bIns="0" rtlCol="0">
-            <a:spAutoFit/>
-          </a:bodyPr>
-          <a:lstStyle/>
-          <a:p>
-            <a:pPr>
-              <a:spcAft>
-                <a:spcPts val="420"/>
-              </a:spcAft>
-            </a:pPr>
-            <a:r>
-              <a:rPr lang="en-US" sz="1400" dirty="0">
-                <a:solidFill>
-                  <a:schemeClr val="accent2"/>
-                </a:solidFill>
-              </a:rPr>
-              <a:t>PKCA: 3530</a:t>
-            </a:r>
-            <a:endParaRPr lang="de-DE" sz="1400" dirty="0" err="1">
-              <a:solidFill>
-                <a:schemeClr val="accent2"/>
-              </a:solidFill>
-            </a:endParaRPr>
-          </a:p>
-        </p:txBody>
-      </p:sp>
-      <p:sp>
-        <p:nvSpPr>
-          <p:cNvPr id="11" name="Textfeld 10">
-            <a:extLst>
-              <a:ext uri="{FF2B5EF4-FFF2-40B4-BE49-F238E27FC236}">
-                <a16:creationId xmlns:a16="http://schemas.microsoft.com/office/drawing/2014/main" id="{E64FA043-0AC6-4B5A-986C-5A1550B48748}"/>
-              </a:ext>
-            </a:extLst>
-          </p:cNvPr>
-          <p:cNvSpPr txBox="1"/>
-          <p:nvPr/>
-        </p:nvSpPr>
-        <p:spPr>
-          <a:xfrm>
-            <a:off x="4854474" y="2478110"/>
-            <a:ext cx="955967" cy="215444"/>
-          </a:xfrm>
-          <a:prstGeom prst="rect">
-            <a:avLst/>
-          </a:prstGeom>
-          <a:noFill/>
-        </p:spPr>
-        <p:txBody>
-          <a:bodyPr wrap="none" lIns="0" tIns="0" rIns="0" bIns="0" rtlCol="0">
-            <a:spAutoFit/>
-          </a:bodyPr>
-          <a:lstStyle/>
-          <a:p>
-            <a:pPr>
-              <a:spcAft>
-                <a:spcPts val="420"/>
-              </a:spcAft>
-            </a:pPr>
-            <a:r>
-              <a:rPr lang="en-US" sz="1400" dirty="0">
-                <a:solidFill>
-                  <a:schemeClr val="accent2"/>
-                </a:solidFill>
-              </a:rPr>
-              <a:t>RAPTOR: 255</a:t>
-            </a:r>
-            <a:endParaRPr lang="de-DE" sz="1400" dirty="0" err="1">
-              <a:solidFill>
-                <a:schemeClr val="accent2"/>
-              </a:solidFill>
-            </a:endParaRPr>
-          </a:p>
-        </p:txBody>
-      </p:sp>
-      <p:sp>
-        <p:nvSpPr>
-          <p:cNvPr id="12" name="Textfeld 11">
-            <a:extLst>
-              <a:ext uri="{FF2B5EF4-FFF2-40B4-BE49-F238E27FC236}">
-                <a16:creationId xmlns:a16="http://schemas.microsoft.com/office/drawing/2014/main" id="{B4D2F961-5006-432B-9261-50C042740BA2}"/>
-              </a:ext>
-            </a:extLst>
-          </p:cNvPr>
-          <p:cNvSpPr txBox="1"/>
-          <p:nvPr/>
-        </p:nvSpPr>
-        <p:spPr>
-          <a:xfrm>
-            <a:off x="7333908" y="2414243"/>
-            <a:ext cx="856004" cy="215444"/>
-          </a:xfrm>
-          <a:prstGeom prst="rect">
-            <a:avLst/>
-          </a:prstGeom>
-          <a:noFill/>
-        </p:spPr>
-        <p:txBody>
-          <a:bodyPr wrap="none" lIns="0" tIns="0" rIns="0" bIns="0" rtlCol="0">
-            <a:spAutoFit/>
-          </a:bodyPr>
-          <a:lstStyle/>
-          <a:p>
-            <a:pPr>
-              <a:spcAft>
-                <a:spcPts val="420"/>
-              </a:spcAft>
-            </a:pPr>
-            <a:r>
-              <a:rPr lang="en-US" sz="1400" dirty="0">
-                <a:solidFill>
-                  <a:schemeClr val="accent2"/>
-                </a:solidFill>
-              </a:rPr>
-              <a:t>SOD1: 2160</a:t>
-            </a:r>
-            <a:endParaRPr lang="de-DE" sz="1400" dirty="0" err="1">
-              <a:solidFill>
-                <a:schemeClr val="accent2"/>
-              </a:solidFill>
-            </a:endParaRPr>
-          </a:p>
-        </p:txBody>
-      </p:sp>
-      <p:sp>
-        <p:nvSpPr>
-          <p:cNvPr id="13" name="Textfeld 12">
-            <a:extLst>
-              <a:ext uri="{FF2B5EF4-FFF2-40B4-BE49-F238E27FC236}">
-                <a16:creationId xmlns:a16="http://schemas.microsoft.com/office/drawing/2014/main" id="{CE4A8F11-056E-45FC-9078-6AAAB608E6D5}"/>
-              </a:ext>
-            </a:extLst>
-          </p:cNvPr>
-          <p:cNvSpPr txBox="1"/>
-          <p:nvPr/>
-        </p:nvSpPr>
-        <p:spPr>
-          <a:xfrm>
-            <a:off x="722312" y="3031721"/>
-            <a:ext cx="710131" cy="215444"/>
-          </a:xfrm>
-          <a:prstGeom prst="rect">
-            <a:avLst/>
-          </a:prstGeom>
-          <a:noFill/>
-        </p:spPr>
-        <p:txBody>
-          <a:bodyPr wrap="square" lIns="0" tIns="0" rIns="0" bIns="0" rtlCol="0">
-            <a:spAutoFit/>
-          </a:bodyPr>
-          <a:lstStyle/>
-          <a:p>
-            <a:pPr>
-              <a:spcAft>
-                <a:spcPts val="420"/>
-              </a:spcAft>
-            </a:pPr>
-            <a:r>
-              <a:rPr lang="en-US" sz="1400" dirty="0">
-                <a:solidFill>
-                  <a:schemeClr val="accent2"/>
-                </a:solidFill>
-              </a:rPr>
-              <a:t>GluR3: 72</a:t>
-            </a:r>
-            <a:endParaRPr lang="de-DE" sz="1400" dirty="0" err="1">
-              <a:solidFill>
-                <a:schemeClr val="accent2"/>
-              </a:solidFill>
-            </a:endParaRPr>
-          </a:p>
-        </p:txBody>
-      </p:sp>
-      <p:sp>
-        <p:nvSpPr>
-          <p:cNvPr id="14" name="Textfeld 13">
-            <a:extLst>
-              <a:ext uri="{FF2B5EF4-FFF2-40B4-BE49-F238E27FC236}">
-                <a16:creationId xmlns:a16="http://schemas.microsoft.com/office/drawing/2014/main" id="{0EF2C466-2C19-4C69-AA90-AB7F8AB64662}"/>
-              </a:ext>
-            </a:extLst>
-          </p:cNvPr>
-          <p:cNvSpPr txBox="1"/>
-          <p:nvPr/>
-        </p:nvSpPr>
-        <p:spPr>
-          <a:xfrm>
-            <a:off x="2235744" y="3062743"/>
-            <a:ext cx="843180" cy="215444"/>
-          </a:xfrm>
-          <a:prstGeom prst="rect">
-            <a:avLst/>
-          </a:prstGeom>
-          <a:noFill/>
-        </p:spPr>
-        <p:txBody>
-          <a:bodyPr wrap="square" lIns="0" tIns="0" rIns="0" bIns="0" rtlCol="0">
-            <a:spAutoFit/>
-          </a:bodyPr>
-          <a:lstStyle/>
-          <a:p>
-            <a:pPr>
-              <a:spcAft>
-                <a:spcPts val="420"/>
-              </a:spcAft>
-            </a:pPr>
-            <a:r>
-              <a:rPr lang="en-US" sz="1400" dirty="0">
-                <a:solidFill>
-                  <a:schemeClr val="accent2"/>
-                </a:solidFill>
-              </a:rPr>
-              <a:t>pGSK3B: 19</a:t>
-            </a:r>
-            <a:endParaRPr lang="de-DE" sz="1400" dirty="0" err="1">
-              <a:solidFill>
-                <a:schemeClr val="accent2"/>
-              </a:solidFill>
-            </a:endParaRPr>
-          </a:p>
-        </p:txBody>
-      </p:sp>
-      <p:sp>
-        <p:nvSpPr>
-          <p:cNvPr id="15" name="Textfeld 14">
-            <a:extLst>
-              <a:ext uri="{FF2B5EF4-FFF2-40B4-BE49-F238E27FC236}">
-                <a16:creationId xmlns:a16="http://schemas.microsoft.com/office/drawing/2014/main" id="{23650CB0-DB48-4211-B9E0-77EF6A07EE81}"/>
-              </a:ext>
-            </a:extLst>
-          </p:cNvPr>
-          <p:cNvSpPr txBox="1"/>
-          <p:nvPr/>
-        </p:nvSpPr>
-        <p:spPr>
-          <a:xfrm>
-            <a:off x="3617912" y="3035717"/>
-            <a:ext cx="745397" cy="215444"/>
-          </a:xfrm>
-          <a:prstGeom prst="rect">
-            <a:avLst/>
-          </a:prstGeom>
-          <a:noFill/>
-        </p:spPr>
-        <p:txBody>
-          <a:bodyPr wrap="square" lIns="0" tIns="0" rIns="0" bIns="0" rtlCol="0">
-            <a:spAutoFit/>
-          </a:bodyPr>
-          <a:lstStyle/>
-          <a:p>
-            <a:pPr>
-              <a:spcAft>
-                <a:spcPts val="420"/>
-              </a:spcAft>
-            </a:pPr>
-            <a:r>
-              <a:rPr lang="en-US" sz="1400" dirty="0" err="1">
-                <a:solidFill>
-                  <a:schemeClr val="accent2"/>
-                </a:solidFill>
-              </a:rPr>
-              <a:t>pCREB</a:t>
-            </a:r>
-            <a:r>
-              <a:rPr lang="en-US" sz="1400" dirty="0">
-                <a:solidFill>
-                  <a:schemeClr val="accent2"/>
-                </a:solidFill>
-              </a:rPr>
-              <a:t>: 76</a:t>
-            </a:r>
-            <a:endParaRPr lang="de-DE" sz="1400" dirty="0" err="1">
-              <a:solidFill>
-                <a:schemeClr val="accent2"/>
-              </a:solidFill>
-            </a:endParaRPr>
-          </a:p>
-        </p:txBody>
-      </p:sp>
-      <p:sp>
-        <p:nvSpPr>
-          <p:cNvPr id="16" name="Textfeld 15">
-            <a:extLst>
-              <a:ext uri="{FF2B5EF4-FFF2-40B4-BE49-F238E27FC236}">
-                <a16:creationId xmlns:a16="http://schemas.microsoft.com/office/drawing/2014/main" id="{69F0FE0B-863E-498E-9D04-54A38A5E5BE7}"/>
-              </a:ext>
-            </a:extLst>
-          </p:cNvPr>
-          <p:cNvSpPr txBox="1"/>
-          <p:nvPr/>
-        </p:nvSpPr>
-        <p:spPr>
-          <a:xfrm>
-            <a:off x="5482781" y="3031954"/>
-            <a:ext cx="1030731" cy="215444"/>
-          </a:xfrm>
-          <a:prstGeom prst="rect">
-            <a:avLst/>
-          </a:prstGeom>
-          <a:noFill/>
-        </p:spPr>
-        <p:txBody>
-          <a:bodyPr wrap="none" lIns="0" tIns="0" rIns="0" bIns="0" rtlCol="0">
-            <a:spAutoFit/>
-          </a:bodyPr>
-          <a:lstStyle/>
-          <a:p>
-            <a:pPr>
-              <a:spcAft>
-                <a:spcPts val="420"/>
-              </a:spcAft>
-            </a:pPr>
-            <a:r>
-              <a:rPr lang="en-US" sz="1400" dirty="0" err="1">
-                <a:solidFill>
-                  <a:schemeClr val="accent2"/>
-                </a:solidFill>
-              </a:rPr>
-              <a:t>pNUMB</a:t>
-            </a:r>
-            <a:r>
-              <a:rPr lang="en-US" sz="1400" dirty="0">
-                <a:solidFill>
-                  <a:schemeClr val="accent2"/>
-                </a:solidFill>
-              </a:rPr>
-              <a:t>: 1270</a:t>
-            </a:r>
-            <a:endParaRPr lang="de-DE" sz="1400" dirty="0" err="1">
-              <a:solidFill>
-                <a:schemeClr val="accent2"/>
-              </a:solidFill>
-            </a:endParaRPr>
-          </a:p>
-        </p:txBody>
-      </p:sp>
-      <p:sp>
-        <p:nvSpPr>
-          <p:cNvPr id="17" name="Textfeld 16">
-            <a:extLst>
-              <a:ext uri="{FF2B5EF4-FFF2-40B4-BE49-F238E27FC236}">
-                <a16:creationId xmlns:a16="http://schemas.microsoft.com/office/drawing/2014/main" id="{EBA71058-09F1-403B-A55F-10754C3FE33A}"/>
-              </a:ext>
-            </a:extLst>
-          </p:cNvPr>
-          <p:cNvSpPr txBox="1"/>
-          <p:nvPr/>
-        </p:nvSpPr>
-        <p:spPr>
-          <a:xfrm>
-            <a:off x="6850945" y="3031721"/>
-            <a:ext cx="729367" cy="215444"/>
-          </a:xfrm>
-          <a:prstGeom prst="rect">
-            <a:avLst/>
-          </a:prstGeom>
-          <a:noFill/>
-        </p:spPr>
-        <p:txBody>
-          <a:bodyPr wrap="none" lIns="0" tIns="0" rIns="0" bIns="0" rtlCol="0">
-            <a:spAutoFit/>
-          </a:bodyPr>
-          <a:lstStyle/>
-          <a:p>
-            <a:pPr>
-              <a:spcAft>
-                <a:spcPts val="420"/>
-              </a:spcAft>
-            </a:pPr>
-            <a:r>
-              <a:rPr lang="en-US" sz="1400" dirty="0">
-                <a:solidFill>
-                  <a:schemeClr val="accent2"/>
-                </a:solidFill>
-              </a:rPr>
-              <a:t>P38: 3620</a:t>
-            </a:r>
-            <a:endParaRPr lang="de-DE" sz="1400" dirty="0" err="1">
-              <a:solidFill>
-                <a:schemeClr val="accent2"/>
-              </a:solidFill>
-            </a:endParaRPr>
-          </a:p>
-        </p:txBody>
-      </p:sp>
-      <p:sp>
-        <p:nvSpPr>
-          <p:cNvPr id="18" name="Textfeld 17">
-            <a:extLst>
-              <a:ext uri="{FF2B5EF4-FFF2-40B4-BE49-F238E27FC236}">
-                <a16:creationId xmlns:a16="http://schemas.microsoft.com/office/drawing/2014/main" id="{D168792E-E0DE-4008-9AF4-FC8CD23190EF}"/>
-              </a:ext>
-            </a:extLst>
-          </p:cNvPr>
-          <p:cNvSpPr txBox="1"/>
-          <p:nvPr/>
-        </p:nvSpPr>
-        <p:spPr>
-          <a:xfrm>
-            <a:off x="7855561" y="3031721"/>
-            <a:ext cx="1020151" cy="215444"/>
-          </a:xfrm>
-          <a:prstGeom prst="rect">
-            <a:avLst/>
-          </a:prstGeom>
-          <a:noFill/>
-        </p:spPr>
-        <p:txBody>
-          <a:bodyPr wrap="none" lIns="0" tIns="0" rIns="0" bIns="0" rtlCol="0">
-            <a:spAutoFit/>
-          </a:bodyPr>
-          <a:lstStyle/>
-          <a:p>
-            <a:pPr>
-              <a:spcAft>
-                <a:spcPts val="420"/>
-              </a:spcAft>
-            </a:pPr>
-            <a:r>
-              <a:rPr lang="en-US" sz="1400" dirty="0">
-                <a:solidFill>
-                  <a:schemeClr val="accent2"/>
-                </a:solidFill>
-              </a:rPr>
-              <a:t>AcetylH3K9: 7</a:t>
-            </a:r>
-            <a:endParaRPr lang="de-DE" sz="1400" dirty="0" err="1">
-              <a:solidFill>
-                <a:schemeClr val="accent2"/>
-              </a:solidFill>
-            </a:endParaRPr>
-          </a:p>
-        </p:txBody>
-      </p:sp>
-      <p:cxnSp>
-        <p:nvCxnSpPr>
-          <p:cNvPr id="20" name="Gerader Verbinder 19">
-            <a:extLst>
-              <a:ext uri="{FF2B5EF4-FFF2-40B4-BE49-F238E27FC236}">
-                <a16:creationId xmlns:a16="http://schemas.microsoft.com/office/drawing/2014/main" id="{6D3C79F8-9874-4C59-B56B-3EA512CA80D6}"/>
-              </a:ext>
-            </a:extLst>
-          </p:cNvPr>
-          <p:cNvCxnSpPr>
-            <a:cxnSpLocks/>
-            <a:stCxn id="6" idx="1"/>
-            <a:endCxn id="7" idx="0"/>
-          </p:cNvCxnSpPr>
-          <p:nvPr/>
-        </p:nvCxnSpPr>
-        <p:spPr>
-          <a:xfrm flipH="1">
-            <a:off x="2606775" y="1757928"/>
-            <a:ext cx="1315937" cy="194911"/>
-          </a:xfrm>
-          <a:prstGeom prst="line">
-            <a:avLst/>
-          </a:prstGeom>
-          <a:ln w="12700">
-            <a:solidFill>
-              <a:schemeClr val="accent2"/>
-            </a:solidFill>
-            <a:tailEnd type="none" w="lg" len="med"/>
-          </a:ln>
-        </p:spPr>
-        <p:style>
-          <a:lnRef idx="1">
-            <a:schemeClr val="accent1"/>
-          </a:lnRef>
-          <a:fillRef idx="0">
-            <a:schemeClr val="accent1"/>
-          </a:fillRef>
-          <a:effectRef idx="0">
-            <a:schemeClr val="accent1"/>
-          </a:effectRef>
-          <a:fontRef idx="minor">
-            <a:schemeClr val="tx1"/>
-          </a:fontRef>
-        </p:style>
-      </p:cxnSp>
-      <p:cxnSp>
-        <p:nvCxnSpPr>
-          <p:cNvPr id="22" name="Gerader Verbinder 21">
-            <a:extLst>
-              <a:ext uri="{FF2B5EF4-FFF2-40B4-BE49-F238E27FC236}">
-                <a16:creationId xmlns:a16="http://schemas.microsoft.com/office/drawing/2014/main" id="{4FA0435F-F6EF-4CD2-8C63-0B3805844E47}"/>
-              </a:ext>
-            </a:extLst>
-          </p:cNvPr>
-          <p:cNvCxnSpPr>
-            <a:stCxn id="6" idx="3"/>
-            <a:endCxn id="8" idx="0"/>
-          </p:cNvCxnSpPr>
-          <p:nvPr/>
-        </p:nvCxnSpPr>
-        <p:spPr>
-          <a:xfrm>
-            <a:off x="4757877" y="1757928"/>
-            <a:ext cx="1506080" cy="194911"/>
-          </a:xfrm>
-          <a:prstGeom prst="line">
-            <a:avLst/>
-          </a:prstGeom>
-          <a:ln w="12700">
-            <a:solidFill>
-              <a:schemeClr val="accent2"/>
-            </a:solidFill>
-            <a:tailEnd type="none" w="lg" len="med"/>
-          </a:ln>
-        </p:spPr>
-        <p:style>
-          <a:lnRef idx="1">
-            <a:schemeClr val="accent1"/>
-          </a:lnRef>
-          <a:fillRef idx="0">
-            <a:schemeClr val="accent1"/>
-          </a:fillRef>
-          <a:effectRef idx="0">
-            <a:schemeClr val="accent1"/>
-          </a:effectRef>
-          <a:fontRef idx="minor">
-            <a:schemeClr val="tx1"/>
-          </a:fontRef>
-        </p:style>
-      </p:cxnSp>
-      <p:cxnSp>
-        <p:nvCxnSpPr>
-          <p:cNvPr id="25" name="Gerader Verbinder 24">
-            <a:extLst>
-              <a:ext uri="{FF2B5EF4-FFF2-40B4-BE49-F238E27FC236}">
-                <a16:creationId xmlns:a16="http://schemas.microsoft.com/office/drawing/2014/main" id="{C6701025-9CB5-4A1A-81C1-18F4EFCFE1EA}"/>
-              </a:ext>
-            </a:extLst>
-          </p:cNvPr>
-          <p:cNvCxnSpPr>
-            <a:stCxn id="7" idx="1"/>
-            <a:endCxn id="9" idx="0"/>
-          </p:cNvCxnSpPr>
-          <p:nvPr/>
-        </p:nvCxnSpPr>
-        <p:spPr>
-          <a:xfrm flipH="1">
-            <a:off x="1840539" y="2060561"/>
-            <a:ext cx="452848" cy="461404"/>
-          </a:xfrm>
-          <a:prstGeom prst="line">
-            <a:avLst/>
-          </a:prstGeom>
-          <a:ln w="12700">
-            <a:solidFill>
-              <a:schemeClr val="accent2"/>
-            </a:solidFill>
-            <a:tailEnd type="none" w="lg" len="med"/>
-          </a:ln>
-        </p:spPr>
-        <p:style>
-          <a:lnRef idx="1">
-            <a:schemeClr val="accent1"/>
-          </a:lnRef>
-          <a:fillRef idx="0">
-            <a:schemeClr val="accent1"/>
-          </a:fillRef>
-          <a:effectRef idx="0">
-            <a:schemeClr val="accent1"/>
-          </a:effectRef>
-          <a:fontRef idx="minor">
-            <a:schemeClr val="tx1"/>
-          </a:fontRef>
-        </p:style>
-      </p:cxnSp>
-      <p:cxnSp>
-        <p:nvCxnSpPr>
-          <p:cNvPr id="29" name="Gerader Verbinder 28">
-            <a:extLst>
-              <a:ext uri="{FF2B5EF4-FFF2-40B4-BE49-F238E27FC236}">
-                <a16:creationId xmlns:a16="http://schemas.microsoft.com/office/drawing/2014/main" id="{7A2CBCAA-3B8A-4B66-BB42-0E97D1468207}"/>
-              </a:ext>
-            </a:extLst>
-          </p:cNvPr>
-          <p:cNvCxnSpPr>
-            <a:stCxn id="7" idx="3"/>
-            <a:endCxn id="10" idx="0"/>
-          </p:cNvCxnSpPr>
-          <p:nvPr/>
-        </p:nvCxnSpPr>
-        <p:spPr>
-          <a:xfrm>
-            <a:off x="2920162" y="2060561"/>
-            <a:ext cx="410453" cy="417549"/>
-          </a:xfrm>
-          <a:prstGeom prst="line">
-            <a:avLst/>
-          </a:prstGeom>
-          <a:ln w="12700">
-            <a:solidFill>
-              <a:schemeClr val="accent2"/>
-            </a:solidFill>
-            <a:tailEnd type="none" w="lg" len="med"/>
-          </a:ln>
-        </p:spPr>
-        <p:style>
-          <a:lnRef idx="1">
-            <a:schemeClr val="accent1"/>
-          </a:lnRef>
-          <a:fillRef idx="0">
-            <a:schemeClr val="accent1"/>
-          </a:fillRef>
-          <a:effectRef idx="0">
-            <a:schemeClr val="accent1"/>
-          </a:effectRef>
-          <a:fontRef idx="minor">
-            <a:schemeClr val="tx1"/>
-          </a:fontRef>
-        </p:style>
-      </p:cxnSp>
-      <p:cxnSp>
-        <p:nvCxnSpPr>
-          <p:cNvPr id="33" name="Gerader Verbinder 32">
-            <a:extLst>
-              <a:ext uri="{FF2B5EF4-FFF2-40B4-BE49-F238E27FC236}">
-                <a16:creationId xmlns:a16="http://schemas.microsoft.com/office/drawing/2014/main" id="{EFA5BBF8-830A-428F-B99F-AB4886433956}"/>
-              </a:ext>
-            </a:extLst>
-          </p:cNvPr>
-          <p:cNvCxnSpPr>
-            <a:cxnSpLocks/>
-            <a:stCxn id="9" idx="1"/>
-            <a:endCxn id="13" idx="0"/>
-          </p:cNvCxnSpPr>
-          <p:nvPr/>
-        </p:nvCxnSpPr>
-        <p:spPr>
-          <a:xfrm flipH="1">
-            <a:off x="1077378" y="2629687"/>
-            <a:ext cx="310312" cy="402034"/>
-          </a:xfrm>
-          <a:prstGeom prst="line">
-            <a:avLst/>
-          </a:prstGeom>
-          <a:ln w="12700">
-            <a:solidFill>
-              <a:schemeClr val="accent2"/>
-            </a:solidFill>
-            <a:tailEnd type="none" w="lg" len="med"/>
-          </a:ln>
-        </p:spPr>
-        <p:style>
-          <a:lnRef idx="1">
-            <a:schemeClr val="accent1"/>
-          </a:lnRef>
-          <a:fillRef idx="0">
-            <a:schemeClr val="accent1"/>
-          </a:fillRef>
-          <a:effectRef idx="0">
-            <a:schemeClr val="accent1"/>
-          </a:effectRef>
-          <a:fontRef idx="minor">
-            <a:schemeClr val="tx1"/>
-          </a:fontRef>
-        </p:style>
-      </p:cxnSp>
-      <p:cxnSp>
-        <p:nvCxnSpPr>
-          <p:cNvPr id="35" name="Gerader Verbinder 34">
-            <a:extLst>
-              <a:ext uri="{FF2B5EF4-FFF2-40B4-BE49-F238E27FC236}">
-                <a16:creationId xmlns:a16="http://schemas.microsoft.com/office/drawing/2014/main" id="{2EDA86A8-CB64-46F7-A7C5-A008A3FFCD97}"/>
-              </a:ext>
-            </a:extLst>
-          </p:cNvPr>
-          <p:cNvCxnSpPr>
-            <a:stCxn id="10" idx="1"/>
-            <a:endCxn id="14" idx="0"/>
-          </p:cNvCxnSpPr>
-          <p:nvPr/>
-        </p:nvCxnSpPr>
-        <p:spPr>
-          <a:xfrm flipH="1">
-            <a:off x="2657334" y="2585832"/>
-            <a:ext cx="256724" cy="476911"/>
-          </a:xfrm>
-          <a:prstGeom prst="line">
-            <a:avLst/>
-          </a:prstGeom>
-          <a:ln w="12700">
-            <a:solidFill>
-              <a:schemeClr val="accent2"/>
-            </a:solidFill>
-            <a:tailEnd type="none" w="lg" len="med"/>
-          </a:ln>
-        </p:spPr>
-        <p:style>
-          <a:lnRef idx="1">
-            <a:schemeClr val="accent1"/>
-          </a:lnRef>
-          <a:fillRef idx="0">
-            <a:schemeClr val="accent1"/>
-          </a:fillRef>
-          <a:effectRef idx="0">
-            <a:schemeClr val="accent1"/>
-          </a:effectRef>
-          <a:fontRef idx="minor">
-            <a:schemeClr val="tx1"/>
-          </a:fontRef>
-        </p:style>
-      </p:cxnSp>
-      <p:cxnSp>
-        <p:nvCxnSpPr>
-          <p:cNvPr id="37" name="Gerader Verbinder 36">
-            <a:extLst>
-              <a:ext uri="{FF2B5EF4-FFF2-40B4-BE49-F238E27FC236}">
-                <a16:creationId xmlns:a16="http://schemas.microsoft.com/office/drawing/2014/main" id="{7793903D-3B37-433A-AF0E-386B7B9C3760}"/>
-              </a:ext>
-            </a:extLst>
-          </p:cNvPr>
-          <p:cNvCxnSpPr>
-            <a:stCxn id="10" idx="3"/>
-            <a:endCxn id="15" idx="0"/>
-          </p:cNvCxnSpPr>
-          <p:nvPr/>
-        </p:nvCxnSpPr>
-        <p:spPr>
-          <a:xfrm>
-            <a:off x="3747171" y="2585832"/>
-            <a:ext cx="243440" cy="449885"/>
-          </a:xfrm>
-          <a:prstGeom prst="line">
-            <a:avLst/>
-          </a:prstGeom>
-          <a:ln w="12700">
-            <a:solidFill>
-              <a:schemeClr val="accent2"/>
-            </a:solidFill>
-            <a:tailEnd type="none" w="lg" len="med"/>
-          </a:ln>
-        </p:spPr>
-        <p:style>
-          <a:lnRef idx="1">
-            <a:schemeClr val="accent1"/>
-          </a:lnRef>
-          <a:fillRef idx="0">
-            <a:schemeClr val="accent1"/>
-          </a:fillRef>
-          <a:effectRef idx="0">
-            <a:schemeClr val="accent1"/>
-          </a:effectRef>
-          <a:fontRef idx="minor">
-            <a:schemeClr val="tx1"/>
-          </a:fontRef>
-        </p:style>
-      </p:cxnSp>
-      <p:cxnSp>
-        <p:nvCxnSpPr>
-          <p:cNvPr id="39" name="Gerader Verbinder 38">
-            <a:extLst>
-              <a:ext uri="{FF2B5EF4-FFF2-40B4-BE49-F238E27FC236}">
-                <a16:creationId xmlns:a16="http://schemas.microsoft.com/office/drawing/2014/main" id="{29CD1CBD-6D8B-490E-BE4A-6375D2C30689}"/>
-              </a:ext>
-            </a:extLst>
-          </p:cNvPr>
-          <p:cNvCxnSpPr>
-            <a:stCxn id="11" idx="3"/>
-            <a:endCxn id="16" idx="0"/>
-          </p:cNvCxnSpPr>
-          <p:nvPr/>
-        </p:nvCxnSpPr>
-        <p:spPr>
-          <a:xfrm>
-            <a:off x="5810441" y="2585832"/>
-            <a:ext cx="187706" cy="446122"/>
-          </a:xfrm>
-          <a:prstGeom prst="line">
-            <a:avLst/>
-          </a:prstGeom>
-          <a:ln w="12700">
-            <a:solidFill>
-              <a:schemeClr val="accent2"/>
-            </a:solidFill>
-            <a:tailEnd type="none" w="lg" len="med"/>
-          </a:ln>
-        </p:spPr>
-        <p:style>
-          <a:lnRef idx="1">
-            <a:schemeClr val="accent1"/>
-          </a:lnRef>
-          <a:fillRef idx="0">
-            <a:schemeClr val="accent1"/>
-          </a:fillRef>
-          <a:effectRef idx="0">
-            <a:schemeClr val="accent1"/>
-          </a:effectRef>
-          <a:fontRef idx="minor">
-            <a:schemeClr val="tx1"/>
-          </a:fontRef>
-        </p:style>
-      </p:cxnSp>
-      <p:cxnSp>
-        <p:nvCxnSpPr>
-          <p:cNvPr id="41" name="Gerader Verbinder 40">
-            <a:extLst>
-              <a:ext uri="{FF2B5EF4-FFF2-40B4-BE49-F238E27FC236}">
-                <a16:creationId xmlns:a16="http://schemas.microsoft.com/office/drawing/2014/main" id="{99B9B712-5E17-4875-931E-B099D8981183}"/>
-              </a:ext>
-            </a:extLst>
-          </p:cNvPr>
-          <p:cNvCxnSpPr>
-            <a:stCxn id="8" idx="1"/>
-            <a:endCxn id="11" idx="0"/>
-          </p:cNvCxnSpPr>
-          <p:nvPr/>
-        </p:nvCxnSpPr>
-        <p:spPr>
-          <a:xfrm flipH="1">
-            <a:off x="5332458" y="2060561"/>
-            <a:ext cx="476246" cy="417549"/>
-          </a:xfrm>
-          <a:prstGeom prst="line">
-            <a:avLst/>
-          </a:prstGeom>
-          <a:ln w="12700">
-            <a:solidFill>
-              <a:schemeClr val="accent2"/>
-            </a:solidFill>
-            <a:tailEnd type="none" w="lg" len="med"/>
-          </a:ln>
-        </p:spPr>
-        <p:style>
-          <a:lnRef idx="1">
-            <a:schemeClr val="accent1"/>
-          </a:lnRef>
-          <a:fillRef idx="0">
-            <a:schemeClr val="accent1"/>
-          </a:fillRef>
-          <a:effectRef idx="0">
-            <a:schemeClr val="accent1"/>
-          </a:effectRef>
-          <a:fontRef idx="minor">
-            <a:schemeClr val="tx1"/>
-          </a:fontRef>
-        </p:style>
-      </p:cxnSp>
-      <p:cxnSp>
-        <p:nvCxnSpPr>
-          <p:cNvPr id="43" name="Gerader Verbinder 42">
-            <a:extLst>
-              <a:ext uri="{FF2B5EF4-FFF2-40B4-BE49-F238E27FC236}">
-                <a16:creationId xmlns:a16="http://schemas.microsoft.com/office/drawing/2014/main" id="{228FFAD6-B43B-49B0-A0C7-992DB8512182}"/>
-              </a:ext>
-            </a:extLst>
-          </p:cNvPr>
-          <p:cNvCxnSpPr>
-            <a:stCxn id="8" idx="3"/>
-            <a:endCxn id="12" idx="0"/>
-          </p:cNvCxnSpPr>
-          <p:nvPr/>
-        </p:nvCxnSpPr>
-        <p:spPr>
-          <a:xfrm>
-            <a:off x="6719210" y="2060561"/>
-            <a:ext cx="1042700" cy="353682"/>
-          </a:xfrm>
-          <a:prstGeom prst="line">
-            <a:avLst/>
-          </a:prstGeom>
-          <a:ln w="12700">
-            <a:solidFill>
-              <a:schemeClr val="accent2"/>
-            </a:solidFill>
-            <a:tailEnd type="none" w="lg" len="med"/>
-          </a:ln>
-        </p:spPr>
-        <p:style>
-          <a:lnRef idx="1">
-            <a:schemeClr val="accent1"/>
-          </a:lnRef>
-          <a:fillRef idx="0">
-            <a:schemeClr val="accent1"/>
-          </a:fillRef>
-          <a:effectRef idx="0">
-            <a:schemeClr val="accent1"/>
-          </a:effectRef>
-          <a:fontRef idx="minor">
-            <a:schemeClr val="tx1"/>
-          </a:fontRef>
-        </p:style>
-      </p:cxnSp>
-      <p:cxnSp>
-        <p:nvCxnSpPr>
-          <p:cNvPr id="45" name="Gerader Verbinder 44">
-            <a:extLst>
-              <a:ext uri="{FF2B5EF4-FFF2-40B4-BE49-F238E27FC236}">
-                <a16:creationId xmlns:a16="http://schemas.microsoft.com/office/drawing/2014/main" id="{9E8898A8-836C-48C9-8F4F-2FC26DC7AB6A}"/>
-              </a:ext>
-            </a:extLst>
-          </p:cNvPr>
-          <p:cNvCxnSpPr>
-            <a:stCxn id="12" idx="3"/>
-            <a:endCxn id="18" idx="0"/>
-          </p:cNvCxnSpPr>
-          <p:nvPr/>
-        </p:nvCxnSpPr>
-        <p:spPr>
-          <a:xfrm>
-            <a:off x="8189912" y="2521965"/>
-            <a:ext cx="175725" cy="509756"/>
-          </a:xfrm>
-          <a:prstGeom prst="line">
-            <a:avLst/>
-          </a:prstGeom>
-          <a:ln w="12700">
-            <a:solidFill>
-              <a:schemeClr val="accent2"/>
-            </a:solidFill>
-            <a:tailEnd type="none" w="lg" len="med"/>
-          </a:ln>
-        </p:spPr>
-        <p:style>
-          <a:lnRef idx="1">
-            <a:schemeClr val="accent1"/>
-          </a:lnRef>
-          <a:fillRef idx="0">
-            <a:schemeClr val="accent1"/>
-          </a:fillRef>
-          <a:effectRef idx="0">
-            <a:schemeClr val="accent1"/>
-          </a:effectRef>
-          <a:fontRef idx="minor">
-            <a:schemeClr val="tx1"/>
-          </a:fontRef>
-        </p:style>
-      </p:cxnSp>
-      <p:cxnSp>
-        <p:nvCxnSpPr>
-          <p:cNvPr id="47" name="Gerader Verbinder 46">
-            <a:extLst>
-              <a:ext uri="{FF2B5EF4-FFF2-40B4-BE49-F238E27FC236}">
-                <a16:creationId xmlns:a16="http://schemas.microsoft.com/office/drawing/2014/main" id="{3742C287-0A61-45AB-BF62-8DA3D65DD920}"/>
-              </a:ext>
-            </a:extLst>
-          </p:cNvPr>
-          <p:cNvCxnSpPr>
-            <a:stCxn id="12" idx="1"/>
-            <a:endCxn id="17" idx="0"/>
-          </p:cNvCxnSpPr>
-          <p:nvPr/>
-        </p:nvCxnSpPr>
-        <p:spPr>
-          <a:xfrm flipH="1">
-            <a:off x="7215629" y="2521965"/>
-            <a:ext cx="118279" cy="509756"/>
-          </a:xfrm>
-          <a:prstGeom prst="line">
-            <a:avLst/>
-          </a:prstGeom>
-          <a:ln w="12700">
-            <a:solidFill>
-              <a:schemeClr val="accent2"/>
-            </a:solidFill>
-            <a:tailEnd type="none" w="lg" len="med"/>
-          </a:ln>
-        </p:spPr>
-        <p:style>
-          <a:lnRef idx="1">
-            <a:schemeClr val="accent1"/>
-          </a:lnRef>
-          <a:fillRef idx="0">
-            <a:schemeClr val="accent1"/>
-          </a:fillRef>
-          <a:effectRef idx="0">
-            <a:schemeClr val="accent1"/>
-          </a:effectRef>
-          <a:fontRef idx="minor">
-            <a:schemeClr val="tx1"/>
-          </a:fontRef>
-        </p:style>
-      </p:cxnSp>
-    </p:spTree>
-    <p:extLst>
-      <p:ext uri="{BB962C8B-B14F-4D97-AF65-F5344CB8AC3E}">
-        <p14:creationId xmlns:p14="http://schemas.microsoft.com/office/powerpoint/2010/main" val="3928513839"/>
-      </p:ext>
-    </p:extLst>
-  </p:cSld>
-  <p:clrMapOvr>
-    <a:masterClrMapping/>
-  </p:clrMapOvr>
-</p:sld>
-</file>
-
-<file path=ppt/slides/slide5.xml><?xml version="1.0" encoding="utf-8"?>
-<p:sld xmlns:a="http://schemas.openxmlformats.org/drawingml/2006/main" xmlns:r="http://schemas.openxmlformats.org/officeDocument/2006/relationships" xmlns:p="http://schemas.openxmlformats.org/presentationml/2006/main">
-  <p:cSld>
-    <p:spTree>
-      <p:nvGrpSpPr>
-        <p:cNvPr id="1" name=""/>
-        <p:cNvGrpSpPr/>
-        <p:nvPr/>
-      </p:nvGrpSpPr>
-      <p:grpSpPr>
-        <a:xfrm>
-          <a:off x="0" y="0"/>
-          <a:ext cx="0" cy="0"/>
-          <a:chOff x="0" y="0"/>
-          <a:chExt cx="0" cy="0"/>
-        </a:xfrm>
-      </p:grpSpPr>
-      <p:sp>
-        <p:nvSpPr>
-          <p:cNvPr id="4" name="Titel 3"/>
-          <p:cNvSpPr>
-            <a:spLocks noGrp="1"/>
-          </p:cNvSpPr>
-          <p:nvPr>
-            <p:ph type="title"/>
-          </p:nvPr>
-        </p:nvSpPr>
-        <p:spPr/>
-        <p:txBody>
-          <a:bodyPr/>
-          <a:lstStyle/>
-          <a:p>
-            <a:r>
-              <a:rPr lang="en-US" dirty="0"/>
               <a:t>Group dependent Task</a:t>
             </a:r>
             <a:endParaRPr lang="de-DE" dirty="0"/>
@@ -22131,7 +20724,7 @@
 </p:sld>
 </file>
 
-<file path=ppt/slides/slide6.xml><?xml version="1.0" encoding="utf-8"?>
+<file path=ppt/slides/slide5.xml><?xml version="1.0" encoding="utf-8"?>
 <p:sld xmlns:a="http://schemas.openxmlformats.org/drawingml/2006/main" xmlns:r="http://schemas.openxmlformats.org/officeDocument/2006/relationships" xmlns:p="http://schemas.openxmlformats.org/presentationml/2006/main">
   <p:cSld>
     <p:spTree>
@@ -22221,7 +20814,7 @@
         <p:spPr>
           <a:xfrm>
             <a:off x="1331912" y="4497387"/>
-            <a:ext cx="5482655" cy="215444"/>
+            <a:ext cx="3693319" cy="215444"/>
           </a:xfrm>
           <a:prstGeom prst="rect">
             <a:avLst/>
@@ -22247,13 +20840,8 @@
                   <a:schemeClr val="accent2"/>
                 </a:solidFill>
               </a:rPr>
-              <a:t>Accuracy: 0.829 (Depth 3) 		Accuracy: 0.87 (Depth 7)</a:t>
-            </a:r>
-            <a:endParaRPr lang="de-DE" sz="1400" dirty="0" err="1">
-              <a:solidFill>
-                <a:schemeClr val="accent2"/>
-              </a:solidFill>
-            </a:endParaRPr>
+              <a:t>Accuracy: 0.829 (Depth 3) 		</a:t>
+            </a:r>
           </a:p>
         </p:txBody>
       </p:sp>
@@ -22348,7 +20936,7 @@
 </p:sld>
 </file>
 
-<file path=ppt/slides/slide7.xml><?xml version="1.0" encoding="utf-8"?>
+<file path=ppt/slides/slide6.xml><?xml version="1.0" encoding="utf-8"?>
 <p:sld xmlns:a="http://schemas.openxmlformats.org/drawingml/2006/main" xmlns:r="http://schemas.openxmlformats.org/officeDocument/2006/relationships" xmlns:p="http://schemas.openxmlformats.org/presentationml/2006/main">
   <p:cSld>
     <p:spTree>
@@ -22403,7 +20991,7 @@
         <p:spPr>
           <a:xfrm>
             <a:off x="1331912" y="4497387"/>
-            <a:ext cx="5574026" cy="215444"/>
+            <a:ext cx="2186881" cy="215444"/>
           </a:xfrm>
           <a:prstGeom prst="rect">
             <a:avLst/>
@@ -22429,7 +21017,7 @@
                   <a:schemeClr val="accent2"/>
                 </a:solidFill>
               </a:rPr>
-              <a:t>Accuracy: :0.795 (Depth 3) 		Accuracy: 0.777 (Depth 7)</a:t>
+              <a:t>Accuracy: :0.795 (Depth 3) </a:t>
             </a:r>
             <a:endParaRPr lang="de-DE" sz="1400" dirty="0" err="1">
               <a:solidFill>
@@ -22565,7 +21153,7 @@
 </p:sld>
 </file>
 
-<file path=ppt/slides/slide8.xml><?xml version="1.0" encoding="utf-8"?>
+<file path=ppt/slides/slide7.xml><?xml version="1.0" encoding="utf-8"?>
 <p:sld xmlns:a="http://schemas.openxmlformats.org/drawingml/2006/main" xmlns:r="http://schemas.openxmlformats.org/officeDocument/2006/relationships" xmlns:p="http://schemas.openxmlformats.org/presentationml/2006/main">
   <p:cSld>
     <p:spTree>

</xml_diff>